<commit_message>
Added my data in the ppt
</commit_message>
<xml_diff>
--- a/Crime in Chicago, A Socioeconomic Exploration.pptx
+++ b/Crime in Chicago, A Socioeconomic Exploration.pptx
@@ -9,7 +9,14 @@
     <p:sldId id="258" r:id="rId3"/>
     <p:sldId id="257" r:id="rId4"/>
     <p:sldId id="259" r:id="rId5"/>
-    <p:sldId id="260" r:id="rId6"/>
+    <p:sldId id="263" r:id="rId6"/>
+    <p:sldId id="262" r:id="rId7"/>
+    <p:sldId id="264" r:id="rId8"/>
+    <p:sldId id="265" r:id="rId9"/>
+    <p:sldId id="266" r:id="rId10"/>
+    <p:sldId id="267" r:id="rId11"/>
+    <p:sldId id="268" r:id="rId12"/>
+    <p:sldId id="260" r:id="rId13"/>
   </p:sldIdLst>
   <p:sldSz cx="12192000" cy="6858000"/>
   <p:notesSz cx="6858000" cy="9144000"/>
@@ -275,7 +282,7 @@
             <a:fld id="{F33E6DB1-1B46-4A9E-9DE0-FB3EA5E49B16}" type="datetimeFigureOut">
               <a:rPr lang="en-US" smtClean="0"/>
               <a:pPr/>
-              <a:t>6/11/2018</a:t>
+              <a:t>6/12/18</a:t>
             </a:fld>
             <a:endParaRPr lang="en-US" dirty="0"/>
           </a:p>
@@ -371,13 +378,13 @@
   <p:clrMapOvr>
     <a:masterClrMapping/>
   </p:clrMapOvr>
-  <mc:AlternateContent xmlns:mc="http://schemas.openxmlformats.org/markup-compatibility/2006">
-    <mc:Choice xmlns:p14="http://schemas.microsoft.com/office/powerpoint/2010/main" Requires="p14">
+  <mc:AlternateContent xmlns:mc="http://schemas.openxmlformats.org/markup-compatibility/2006" xmlns:p14="http://schemas.microsoft.com/office/powerpoint/2010/main">
+    <mc:Choice Requires="p14">
       <p:transition spd="med" p14:dur="550">
         <p:fade/>
       </p:transition>
     </mc:Choice>
-    <mc:Fallback>
+    <mc:Fallback xmlns="">
       <p:transition spd="med">
         <p:fade/>
       </p:transition>
@@ -566,7 +573,7 @@
             <a:fld id="{F33E6DB1-1B46-4A9E-9DE0-FB3EA5E49B16}" type="datetimeFigureOut">
               <a:rPr lang="en-US" smtClean="0"/>
               <a:pPr/>
-              <a:t>6/11/2018</a:t>
+              <a:t>6/12/18</a:t>
             </a:fld>
             <a:endParaRPr lang="en-US" dirty="0"/>
           </a:p>
@@ -679,13 +686,13 @@
   <p:sldLayoutIdLst>
     <p:sldLayoutId id="2147483649" r:id="rId1"/>
   </p:sldLayoutIdLst>
-  <mc:AlternateContent xmlns:mc="http://schemas.openxmlformats.org/markup-compatibility/2006">
-    <mc:Choice xmlns:p14="http://schemas.microsoft.com/office/powerpoint/2010/main" Requires="p14">
+  <mc:AlternateContent xmlns:mc="http://schemas.openxmlformats.org/markup-compatibility/2006" xmlns:p14="http://schemas.microsoft.com/office/powerpoint/2010/main">
+    <mc:Choice Requires="p14">
       <p:transition spd="med" p14:dur="550">
         <p:fade/>
       </p:transition>
     </mc:Choice>
-    <mc:Fallback>
+    <mc:Fallback xmlns="">
       <p:transition spd="med">
         <p:fade/>
       </p:transition>
@@ -1111,13 +1118,1433 @@
   <p:clrMapOvr>
     <a:masterClrMapping/>
   </p:clrMapOvr>
-  <mc:AlternateContent xmlns:mc="http://schemas.openxmlformats.org/markup-compatibility/2006">
-    <mc:Choice xmlns:p14="http://schemas.microsoft.com/office/powerpoint/2010/main" Requires="p14">
+  <mc:AlternateContent xmlns:mc="http://schemas.openxmlformats.org/markup-compatibility/2006" xmlns:p14="http://schemas.microsoft.com/office/powerpoint/2010/main">
+    <mc:Choice Requires="p14">
       <p:transition spd="med" p14:dur="550">
         <p:fade/>
       </p:transition>
     </mc:Choice>
-    <mc:Fallback>
+    <mc:Fallback xmlns="">
+      <p:transition spd="med">
+        <p:fade/>
+      </p:transition>
+    </mc:Fallback>
+  </mc:AlternateContent>
+</p:sld>
+</file>
+
+<file path=ppt/slides/slide10.xml><?xml version="1.0" encoding="utf-8"?>
+<p:sld xmlns:a="http://schemas.openxmlformats.org/drawingml/2006/main" xmlns:r="http://schemas.openxmlformats.org/officeDocument/2006/relationships" xmlns:p="http://schemas.openxmlformats.org/presentationml/2006/main">
+  <p:cSld>
+    <p:spTree>
+      <p:nvGrpSpPr>
+        <p:cNvPr id="1" name=""/>
+        <p:cNvGrpSpPr/>
+        <p:nvPr/>
+      </p:nvGrpSpPr>
+      <p:grpSpPr>
+        <a:xfrm>
+          <a:off x="0" y="0"/>
+          <a:ext cx="0" cy="0"/>
+          <a:chOff x="0" y="0"/>
+          <a:chExt cx="0" cy="0"/>
+        </a:xfrm>
+      </p:grpSpPr>
+      <p:sp>
+        <p:nvSpPr>
+          <p:cNvPr id="6" name="Title Placeholder 1">
+            <a:extLst>
+              <a:ext uri="{FF2B5EF4-FFF2-40B4-BE49-F238E27FC236}">
+                <a16:creationId xmlns:a16="http://schemas.microsoft.com/office/drawing/2014/main" id="{0B90DA6A-C92C-4324-A8B3-E2A135292587}"/>
+              </a:ext>
+            </a:extLst>
+          </p:cNvPr>
+          <p:cNvSpPr txBox="1">
+            <a:spLocks/>
+          </p:cNvSpPr>
+          <p:nvPr/>
+        </p:nvSpPr>
+        <p:spPr>
+          <a:xfrm>
+            <a:off x="838200" y="365125"/>
+            <a:ext cx="10515600" cy="1033463"/>
+          </a:xfrm>
+          <a:prstGeom prst="rect">
+            <a:avLst/>
+          </a:prstGeom>
+        </p:spPr>
+        <p:txBody>
+          <a:bodyPr vert="horz" lIns="91440" tIns="45720" rIns="91440" bIns="45720" rtlCol="0" anchor="ctr">
+            <a:normAutofit/>
+          </a:bodyPr>
+          <a:lstStyle>
+            <a:lvl1pPr algn="ctr" defTabSz="914400" rtl="0" eaLnBrk="1" latinLnBrk="0" hangingPunct="1">
+              <a:lnSpc>
+                <a:spcPct val="90000"/>
+              </a:lnSpc>
+              <a:spcBef>
+                <a:spcPct val="0"/>
+              </a:spcBef>
+              <a:buNone/>
+              <a:defRPr sz="6000" kern="1200">
+                <a:solidFill>
+                  <a:schemeClr val="tx1"/>
+                </a:solidFill>
+                <a:latin typeface="+mj-lt"/>
+                <a:ea typeface="+mj-ea"/>
+                <a:cs typeface="+mj-cs"/>
+              </a:defRPr>
+            </a:lvl1pPr>
+          </a:lstStyle>
+          <a:p>
+            <a:r>
+              <a:rPr lang="en-US" dirty="0"/>
+              <a:t>Crime by location</a:t>
+            </a:r>
+          </a:p>
+        </p:txBody>
+      </p:sp>
+      <p:sp>
+        <p:nvSpPr>
+          <p:cNvPr id="7" name="Text Placeholder 2">
+            <a:extLst>
+              <a:ext uri="{FF2B5EF4-FFF2-40B4-BE49-F238E27FC236}">
+                <a16:creationId xmlns:a16="http://schemas.microsoft.com/office/drawing/2014/main" id="{9167F074-A973-485B-8298-94398C48095C}"/>
+              </a:ext>
+            </a:extLst>
+          </p:cNvPr>
+          <p:cNvSpPr txBox="1">
+            <a:spLocks/>
+          </p:cNvSpPr>
+          <p:nvPr/>
+        </p:nvSpPr>
+        <p:spPr>
+          <a:xfrm>
+            <a:off x="838200" y="1825625"/>
+            <a:ext cx="10515600" cy="4351338"/>
+          </a:xfrm>
+          <a:prstGeom prst="rect">
+            <a:avLst/>
+          </a:prstGeom>
+        </p:spPr>
+        <p:txBody>
+          <a:bodyPr vert="horz" lIns="91440" tIns="45720" rIns="91440" bIns="45720" rtlCol="0">
+            <a:normAutofit/>
+          </a:bodyPr>
+          <a:lstStyle>
+            <a:lvl1pPr marL="0" indent="0" algn="ctr" defTabSz="914400" rtl="0" eaLnBrk="1" latinLnBrk="0" hangingPunct="1">
+              <a:lnSpc>
+                <a:spcPct val="90000"/>
+              </a:lnSpc>
+              <a:spcBef>
+                <a:spcPts val="1000"/>
+              </a:spcBef>
+              <a:buFont typeface="Arial" panose="020B0604020202020204" pitchFamily="34" charset="0"/>
+              <a:buNone/>
+              <a:defRPr sz="2400" kern="1200">
+                <a:solidFill>
+                  <a:schemeClr val="tx1"/>
+                </a:solidFill>
+                <a:latin typeface="+mn-lt"/>
+                <a:ea typeface="+mn-ea"/>
+                <a:cs typeface="+mn-cs"/>
+              </a:defRPr>
+            </a:lvl1pPr>
+            <a:lvl2pPr marL="457200" indent="0" algn="ctr" defTabSz="914400" rtl="0" eaLnBrk="1" latinLnBrk="0" hangingPunct="1">
+              <a:lnSpc>
+                <a:spcPct val="90000"/>
+              </a:lnSpc>
+              <a:spcBef>
+                <a:spcPts val="500"/>
+              </a:spcBef>
+              <a:buFont typeface="Arial" panose="020B0604020202020204" pitchFamily="34" charset="0"/>
+              <a:buNone/>
+              <a:defRPr sz="2000" kern="1200">
+                <a:solidFill>
+                  <a:schemeClr val="tx1"/>
+                </a:solidFill>
+                <a:latin typeface="+mn-lt"/>
+                <a:ea typeface="+mn-ea"/>
+                <a:cs typeface="+mn-cs"/>
+              </a:defRPr>
+            </a:lvl2pPr>
+            <a:lvl3pPr marL="914400" indent="0" algn="ctr" defTabSz="914400" rtl="0" eaLnBrk="1" latinLnBrk="0" hangingPunct="1">
+              <a:lnSpc>
+                <a:spcPct val="90000"/>
+              </a:lnSpc>
+              <a:spcBef>
+                <a:spcPts val="500"/>
+              </a:spcBef>
+              <a:buFont typeface="Arial" panose="020B0604020202020204" pitchFamily="34" charset="0"/>
+              <a:buNone/>
+              <a:defRPr sz="1800" kern="1200">
+                <a:solidFill>
+                  <a:schemeClr val="tx1"/>
+                </a:solidFill>
+                <a:latin typeface="+mn-lt"/>
+                <a:ea typeface="+mn-ea"/>
+                <a:cs typeface="+mn-cs"/>
+              </a:defRPr>
+            </a:lvl3pPr>
+            <a:lvl4pPr marL="1371600" indent="0" algn="ctr" defTabSz="914400" rtl="0" eaLnBrk="1" latinLnBrk="0" hangingPunct="1">
+              <a:lnSpc>
+                <a:spcPct val="90000"/>
+              </a:lnSpc>
+              <a:spcBef>
+                <a:spcPts val="500"/>
+              </a:spcBef>
+              <a:buFont typeface="Arial" panose="020B0604020202020204" pitchFamily="34" charset="0"/>
+              <a:buNone/>
+              <a:defRPr sz="1600" kern="1200">
+                <a:solidFill>
+                  <a:schemeClr val="tx1"/>
+                </a:solidFill>
+                <a:latin typeface="+mn-lt"/>
+                <a:ea typeface="+mn-ea"/>
+                <a:cs typeface="+mn-cs"/>
+              </a:defRPr>
+            </a:lvl4pPr>
+            <a:lvl5pPr marL="1828800" indent="0" algn="ctr" defTabSz="914400" rtl="0" eaLnBrk="1" latinLnBrk="0" hangingPunct="1">
+              <a:lnSpc>
+                <a:spcPct val="90000"/>
+              </a:lnSpc>
+              <a:spcBef>
+                <a:spcPts val="500"/>
+              </a:spcBef>
+              <a:buFont typeface="Arial" panose="020B0604020202020204" pitchFamily="34" charset="0"/>
+              <a:buNone/>
+              <a:defRPr sz="1600" kern="1200">
+                <a:solidFill>
+                  <a:schemeClr val="tx1"/>
+                </a:solidFill>
+                <a:latin typeface="+mn-lt"/>
+                <a:ea typeface="+mn-ea"/>
+                <a:cs typeface="+mn-cs"/>
+              </a:defRPr>
+            </a:lvl5pPr>
+            <a:lvl6pPr marL="2286000" indent="0" algn="ctr" defTabSz="914400" rtl="0" eaLnBrk="1" latinLnBrk="0" hangingPunct="1">
+              <a:lnSpc>
+                <a:spcPct val="90000"/>
+              </a:lnSpc>
+              <a:spcBef>
+                <a:spcPts val="500"/>
+              </a:spcBef>
+              <a:buFont typeface="Arial" panose="020B0604020202020204" pitchFamily="34" charset="0"/>
+              <a:buNone/>
+              <a:defRPr sz="1600" kern="1200">
+                <a:solidFill>
+                  <a:schemeClr val="tx1"/>
+                </a:solidFill>
+                <a:latin typeface="+mn-lt"/>
+                <a:ea typeface="+mn-ea"/>
+                <a:cs typeface="+mn-cs"/>
+              </a:defRPr>
+            </a:lvl6pPr>
+            <a:lvl7pPr marL="2743200" indent="0" algn="ctr" defTabSz="914400" rtl="0" eaLnBrk="1" latinLnBrk="0" hangingPunct="1">
+              <a:lnSpc>
+                <a:spcPct val="90000"/>
+              </a:lnSpc>
+              <a:spcBef>
+                <a:spcPts val="500"/>
+              </a:spcBef>
+              <a:buFont typeface="Arial" panose="020B0604020202020204" pitchFamily="34" charset="0"/>
+              <a:buNone/>
+              <a:defRPr sz="1600" kern="1200">
+                <a:solidFill>
+                  <a:schemeClr val="tx1"/>
+                </a:solidFill>
+                <a:latin typeface="+mn-lt"/>
+                <a:ea typeface="+mn-ea"/>
+                <a:cs typeface="+mn-cs"/>
+              </a:defRPr>
+            </a:lvl7pPr>
+            <a:lvl8pPr marL="3200400" indent="0" algn="ctr" defTabSz="914400" rtl="0" eaLnBrk="1" latinLnBrk="0" hangingPunct="1">
+              <a:lnSpc>
+                <a:spcPct val="90000"/>
+              </a:lnSpc>
+              <a:spcBef>
+                <a:spcPts val="500"/>
+              </a:spcBef>
+              <a:buFont typeface="Arial" panose="020B0604020202020204" pitchFamily="34" charset="0"/>
+              <a:buNone/>
+              <a:defRPr sz="1600" kern="1200">
+                <a:solidFill>
+                  <a:schemeClr val="tx1"/>
+                </a:solidFill>
+                <a:latin typeface="+mn-lt"/>
+                <a:ea typeface="+mn-ea"/>
+                <a:cs typeface="+mn-cs"/>
+              </a:defRPr>
+            </a:lvl8pPr>
+            <a:lvl9pPr marL="3657600" indent="0" algn="ctr" defTabSz="914400" rtl="0" eaLnBrk="1" latinLnBrk="0" hangingPunct="1">
+              <a:lnSpc>
+                <a:spcPct val="90000"/>
+              </a:lnSpc>
+              <a:spcBef>
+                <a:spcPts val="500"/>
+              </a:spcBef>
+              <a:buFont typeface="Arial" panose="020B0604020202020204" pitchFamily="34" charset="0"/>
+              <a:buNone/>
+              <a:defRPr sz="1600" kern="1200">
+                <a:solidFill>
+                  <a:schemeClr val="tx1"/>
+                </a:solidFill>
+                <a:latin typeface="+mn-lt"/>
+                <a:ea typeface="+mn-ea"/>
+                <a:cs typeface="+mn-cs"/>
+              </a:defRPr>
+            </a:lvl9pPr>
+          </a:lstStyle>
+          <a:p>
+            <a:pPr lvl="1" algn="l"/>
+            <a:endParaRPr lang="en-US" b="1" dirty="0">
+              <a:solidFill>
+                <a:schemeClr val="accent2">
+                  <a:lumMod val="75000"/>
+                </a:schemeClr>
+              </a:solidFill>
+            </a:endParaRPr>
+          </a:p>
+          <a:p>
+            <a:pPr lvl="2" algn="l"/>
+            <a:endParaRPr lang="en-US" dirty="0"/>
+          </a:p>
+          <a:p>
+            <a:pPr lvl="2" algn="l"/>
+            <a:endParaRPr lang="en-US" dirty="0"/>
+          </a:p>
+          <a:p>
+            <a:pPr lvl="2" algn="l"/>
+            <a:endParaRPr lang="en-US" dirty="0"/>
+          </a:p>
+          <a:p>
+            <a:pPr lvl="2" algn="l"/>
+            <a:endParaRPr lang="en-US" dirty="0"/>
+          </a:p>
+        </p:txBody>
+      </p:sp>
+      <p:sp>
+        <p:nvSpPr>
+          <p:cNvPr id="8" name="Date Placeholder 3">
+            <a:extLst>
+              <a:ext uri="{FF2B5EF4-FFF2-40B4-BE49-F238E27FC236}">
+                <a16:creationId xmlns:a16="http://schemas.microsoft.com/office/drawing/2014/main" id="{F58E9A2E-5660-42AC-A637-A1785328783B}"/>
+              </a:ext>
+            </a:extLst>
+          </p:cNvPr>
+          <p:cNvSpPr>
+            <a:spLocks noGrp="1"/>
+          </p:cNvSpPr>
+          <p:nvPr>
+            <p:ph type="dt" sz="half" idx="10"/>
+          </p:nvPr>
+        </p:nvSpPr>
+        <p:spPr>
+          <a:xfrm>
+            <a:off x="838200" y="6356350"/>
+            <a:ext cx="2743200" cy="365125"/>
+          </a:xfrm>
+        </p:spPr>
+        <p:txBody>
+          <a:bodyPr/>
+          <a:lstStyle>
+            <a:lvl1pPr>
+              <a:defRPr>
+                <a:solidFill>
+                  <a:schemeClr val="tx1">
+                    <a:lumMod val="75000"/>
+                    <a:lumOff val="25000"/>
+                  </a:schemeClr>
+                </a:solidFill>
+              </a:defRPr>
+            </a:lvl1pPr>
+          </a:lstStyle>
+          <a:p>
+            <a:fld id="{F33E6DB1-1B46-4A9E-9DE0-FB3EA5E49B16}" type="datetimeFigureOut">
+              <a:rPr lang="en-US" smtClean="0"/>
+              <a:pPr/>
+              <a:t>6/12/18</a:t>
+            </a:fld>
+            <a:endParaRPr lang="en-US" dirty="0"/>
+          </a:p>
+        </p:txBody>
+      </p:sp>
+      <p:sp>
+        <p:nvSpPr>
+          <p:cNvPr id="9" name="Footer Placeholder 4">
+            <a:extLst>
+              <a:ext uri="{FF2B5EF4-FFF2-40B4-BE49-F238E27FC236}">
+                <a16:creationId xmlns:a16="http://schemas.microsoft.com/office/drawing/2014/main" id="{85AF6068-7533-4FF4-98FF-4FC28EA91E84}"/>
+              </a:ext>
+            </a:extLst>
+          </p:cNvPr>
+          <p:cNvSpPr>
+            <a:spLocks noGrp="1"/>
+          </p:cNvSpPr>
+          <p:nvPr>
+            <p:ph type="ftr" sz="quarter" idx="11"/>
+          </p:nvPr>
+        </p:nvSpPr>
+        <p:spPr>
+          <a:xfrm>
+            <a:off x="4038600" y="6356350"/>
+            <a:ext cx="4114800" cy="365125"/>
+          </a:xfrm>
+        </p:spPr>
+        <p:txBody>
+          <a:bodyPr/>
+          <a:lstStyle>
+            <a:lvl1pPr>
+              <a:defRPr>
+                <a:solidFill>
+                  <a:schemeClr val="tx1">
+                    <a:lumMod val="75000"/>
+                    <a:lumOff val="25000"/>
+                  </a:schemeClr>
+                </a:solidFill>
+              </a:defRPr>
+            </a:lvl1pPr>
+          </a:lstStyle>
+          <a:p>
+            <a:r>
+              <a:rPr lang="en-US" dirty="0"/>
+              <a:t>Crime in Chicago, A Socioeconomic Exploration</a:t>
+            </a:r>
+          </a:p>
+        </p:txBody>
+      </p:sp>
+      <p:sp>
+        <p:nvSpPr>
+          <p:cNvPr id="10" name="Slide Number Placeholder 5">
+            <a:extLst>
+              <a:ext uri="{FF2B5EF4-FFF2-40B4-BE49-F238E27FC236}">
+                <a16:creationId xmlns:a16="http://schemas.microsoft.com/office/drawing/2014/main" id="{8BEE74A5-734B-4BE0-B9D3-3B92252AA9B6}"/>
+              </a:ext>
+            </a:extLst>
+          </p:cNvPr>
+          <p:cNvSpPr>
+            <a:spLocks noGrp="1"/>
+          </p:cNvSpPr>
+          <p:nvPr>
+            <p:ph type="sldNum" sz="quarter" idx="12"/>
+          </p:nvPr>
+        </p:nvSpPr>
+        <p:spPr>
+          <a:xfrm>
+            <a:off x="8610600" y="6356350"/>
+            <a:ext cx="2743200" cy="365125"/>
+          </a:xfrm>
+        </p:spPr>
+        <p:txBody>
+          <a:bodyPr/>
+          <a:lstStyle>
+            <a:lvl1pPr>
+              <a:defRPr>
+                <a:solidFill>
+                  <a:schemeClr val="tx1">
+                    <a:lumMod val="75000"/>
+                    <a:lumOff val="25000"/>
+                  </a:schemeClr>
+                </a:solidFill>
+              </a:defRPr>
+            </a:lvl1pPr>
+          </a:lstStyle>
+          <a:p>
+            <a:fld id="{EB4E44DA-0EBF-471F-933A-3B031DA38E14}" type="slidenum">
+              <a:rPr lang="en-US" smtClean="0"/>
+              <a:pPr/>
+              <a:t>10</a:t>
+            </a:fld>
+            <a:endParaRPr lang="en-US" dirty="0"/>
+          </a:p>
+        </p:txBody>
+      </p:sp>
+      <p:pic>
+        <p:nvPicPr>
+          <p:cNvPr id="4" name="Picture 3">
+            <a:extLst>
+              <a:ext uri="{FF2B5EF4-FFF2-40B4-BE49-F238E27FC236}">
+                <a16:creationId xmlns:a16="http://schemas.microsoft.com/office/drawing/2014/main" id="{649393DE-EC4A-274D-B694-1549B39E2885}"/>
+              </a:ext>
+            </a:extLst>
+          </p:cNvPr>
+          <p:cNvPicPr>
+            <a:picLocks noChangeAspect="1"/>
+          </p:cNvPicPr>
+          <p:nvPr/>
+        </p:nvPicPr>
+        <p:blipFill>
+          <a:blip r:embed="rId2">
+            <a:extLst>
+              <a:ext uri="{28A0092B-C50C-407E-A947-70E740481C1C}">
+                <a14:useLocalDpi xmlns:a14="http://schemas.microsoft.com/office/drawing/2010/main" val="0"/>
+              </a:ext>
+            </a:extLst>
+          </a:blip>
+          <a:stretch>
+            <a:fillRect/>
+          </a:stretch>
+        </p:blipFill>
+        <p:spPr>
+          <a:xfrm>
+            <a:off x="793750" y="1398588"/>
+            <a:ext cx="10604500" cy="5205412"/>
+          </a:xfrm>
+          <a:prstGeom prst="rect">
+            <a:avLst/>
+          </a:prstGeom>
+        </p:spPr>
+      </p:pic>
+    </p:spTree>
+    <p:extLst>
+      <p:ext uri="{BB962C8B-B14F-4D97-AF65-F5344CB8AC3E}">
+        <p14:creationId xmlns:p14="http://schemas.microsoft.com/office/powerpoint/2010/main" val="3032616594"/>
+      </p:ext>
+    </p:extLst>
+  </p:cSld>
+  <p:clrMapOvr>
+    <a:masterClrMapping/>
+  </p:clrMapOvr>
+  <mc:AlternateContent xmlns:mc="http://schemas.openxmlformats.org/markup-compatibility/2006" xmlns:p14="http://schemas.microsoft.com/office/powerpoint/2010/main">
+    <mc:Choice Requires="p14">
+      <p:transition spd="med" p14:dur="550">
+        <p:fade/>
+      </p:transition>
+    </mc:Choice>
+    <mc:Fallback xmlns="">
+      <p:transition spd="med">
+        <p:fade/>
+      </p:transition>
+    </mc:Fallback>
+  </mc:AlternateContent>
+</p:sld>
+</file>
+
+<file path=ppt/slides/slide11.xml><?xml version="1.0" encoding="utf-8"?>
+<p:sld xmlns:a="http://schemas.openxmlformats.org/drawingml/2006/main" xmlns:r="http://schemas.openxmlformats.org/officeDocument/2006/relationships" xmlns:p="http://schemas.openxmlformats.org/presentationml/2006/main">
+  <p:cSld>
+    <p:spTree>
+      <p:nvGrpSpPr>
+        <p:cNvPr id="1" name=""/>
+        <p:cNvGrpSpPr/>
+        <p:nvPr/>
+      </p:nvGrpSpPr>
+      <p:grpSpPr>
+        <a:xfrm>
+          <a:off x="0" y="0"/>
+          <a:ext cx="0" cy="0"/>
+          <a:chOff x="0" y="0"/>
+          <a:chExt cx="0" cy="0"/>
+        </a:xfrm>
+      </p:grpSpPr>
+      <p:sp>
+        <p:nvSpPr>
+          <p:cNvPr id="6" name="Title Placeholder 1">
+            <a:extLst>
+              <a:ext uri="{FF2B5EF4-FFF2-40B4-BE49-F238E27FC236}">
+                <a16:creationId xmlns:a16="http://schemas.microsoft.com/office/drawing/2014/main" id="{0B90DA6A-C92C-4324-A8B3-E2A135292587}"/>
+              </a:ext>
+            </a:extLst>
+          </p:cNvPr>
+          <p:cNvSpPr txBox="1">
+            <a:spLocks/>
+          </p:cNvSpPr>
+          <p:nvPr/>
+        </p:nvSpPr>
+        <p:spPr>
+          <a:xfrm>
+            <a:off x="838200" y="365126"/>
+            <a:ext cx="10515600" cy="792760"/>
+          </a:xfrm>
+          <a:prstGeom prst="rect">
+            <a:avLst/>
+          </a:prstGeom>
+        </p:spPr>
+        <p:txBody>
+          <a:bodyPr vert="horz" lIns="91440" tIns="45720" rIns="91440" bIns="45720" rtlCol="0" anchor="ctr">
+            <a:normAutofit fontScale="92500" lnSpcReduction="10000"/>
+          </a:bodyPr>
+          <a:lstStyle>
+            <a:lvl1pPr algn="ctr" defTabSz="914400" rtl="0" eaLnBrk="1" latinLnBrk="0" hangingPunct="1">
+              <a:lnSpc>
+                <a:spcPct val="90000"/>
+              </a:lnSpc>
+              <a:spcBef>
+                <a:spcPct val="0"/>
+              </a:spcBef>
+              <a:buNone/>
+              <a:defRPr sz="6000" kern="1200">
+                <a:solidFill>
+                  <a:schemeClr val="tx1"/>
+                </a:solidFill>
+                <a:latin typeface="+mj-lt"/>
+                <a:ea typeface="+mj-ea"/>
+                <a:cs typeface="+mj-cs"/>
+              </a:defRPr>
+            </a:lvl1pPr>
+          </a:lstStyle>
+          <a:p>
+            <a:r>
+              <a:rPr lang="en-US" dirty="0"/>
+              <a:t>Arrest Rates by Community Area</a:t>
+            </a:r>
+          </a:p>
+        </p:txBody>
+      </p:sp>
+      <p:sp>
+        <p:nvSpPr>
+          <p:cNvPr id="7" name="Text Placeholder 2">
+            <a:extLst>
+              <a:ext uri="{FF2B5EF4-FFF2-40B4-BE49-F238E27FC236}">
+                <a16:creationId xmlns:a16="http://schemas.microsoft.com/office/drawing/2014/main" id="{9167F074-A973-485B-8298-94398C48095C}"/>
+              </a:ext>
+            </a:extLst>
+          </p:cNvPr>
+          <p:cNvSpPr txBox="1">
+            <a:spLocks/>
+          </p:cNvSpPr>
+          <p:nvPr/>
+        </p:nvSpPr>
+        <p:spPr>
+          <a:xfrm>
+            <a:off x="838200" y="1825625"/>
+            <a:ext cx="10515600" cy="4351338"/>
+          </a:xfrm>
+          <a:prstGeom prst="rect">
+            <a:avLst/>
+          </a:prstGeom>
+        </p:spPr>
+        <p:txBody>
+          <a:bodyPr vert="horz" lIns="91440" tIns="45720" rIns="91440" bIns="45720" rtlCol="0">
+            <a:normAutofit/>
+          </a:bodyPr>
+          <a:lstStyle>
+            <a:lvl1pPr marL="0" indent="0" algn="ctr" defTabSz="914400" rtl="0" eaLnBrk="1" latinLnBrk="0" hangingPunct="1">
+              <a:lnSpc>
+                <a:spcPct val="90000"/>
+              </a:lnSpc>
+              <a:spcBef>
+                <a:spcPts val="1000"/>
+              </a:spcBef>
+              <a:buFont typeface="Arial" panose="020B0604020202020204" pitchFamily="34" charset="0"/>
+              <a:buNone/>
+              <a:defRPr sz="2400" kern="1200">
+                <a:solidFill>
+                  <a:schemeClr val="tx1"/>
+                </a:solidFill>
+                <a:latin typeface="+mn-lt"/>
+                <a:ea typeface="+mn-ea"/>
+                <a:cs typeface="+mn-cs"/>
+              </a:defRPr>
+            </a:lvl1pPr>
+            <a:lvl2pPr marL="457200" indent="0" algn="ctr" defTabSz="914400" rtl="0" eaLnBrk="1" latinLnBrk="0" hangingPunct="1">
+              <a:lnSpc>
+                <a:spcPct val="90000"/>
+              </a:lnSpc>
+              <a:spcBef>
+                <a:spcPts val="500"/>
+              </a:spcBef>
+              <a:buFont typeface="Arial" panose="020B0604020202020204" pitchFamily="34" charset="0"/>
+              <a:buNone/>
+              <a:defRPr sz="2000" kern="1200">
+                <a:solidFill>
+                  <a:schemeClr val="tx1"/>
+                </a:solidFill>
+                <a:latin typeface="+mn-lt"/>
+                <a:ea typeface="+mn-ea"/>
+                <a:cs typeface="+mn-cs"/>
+              </a:defRPr>
+            </a:lvl2pPr>
+            <a:lvl3pPr marL="914400" indent="0" algn="ctr" defTabSz="914400" rtl="0" eaLnBrk="1" latinLnBrk="0" hangingPunct="1">
+              <a:lnSpc>
+                <a:spcPct val="90000"/>
+              </a:lnSpc>
+              <a:spcBef>
+                <a:spcPts val="500"/>
+              </a:spcBef>
+              <a:buFont typeface="Arial" panose="020B0604020202020204" pitchFamily="34" charset="0"/>
+              <a:buNone/>
+              <a:defRPr sz="1800" kern="1200">
+                <a:solidFill>
+                  <a:schemeClr val="tx1"/>
+                </a:solidFill>
+                <a:latin typeface="+mn-lt"/>
+                <a:ea typeface="+mn-ea"/>
+                <a:cs typeface="+mn-cs"/>
+              </a:defRPr>
+            </a:lvl3pPr>
+            <a:lvl4pPr marL="1371600" indent="0" algn="ctr" defTabSz="914400" rtl="0" eaLnBrk="1" latinLnBrk="0" hangingPunct="1">
+              <a:lnSpc>
+                <a:spcPct val="90000"/>
+              </a:lnSpc>
+              <a:spcBef>
+                <a:spcPts val="500"/>
+              </a:spcBef>
+              <a:buFont typeface="Arial" panose="020B0604020202020204" pitchFamily="34" charset="0"/>
+              <a:buNone/>
+              <a:defRPr sz="1600" kern="1200">
+                <a:solidFill>
+                  <a:schemeClr val="tx1"/>
+                </a:solidFill>
+                <a:latin typeface="+mn-lt"/>
+                <a:ea typeface="+mn-ea"/>
+                <a:cs typeface="+mn-cs"/>
+              </a:defRPr>
+            </a:lvl4pPr>
+            <a:lvl5pPr marL="1828800" indent="0" algn="ctr" defTabSz="914400" rtl="0" eaLnBrk="1" latinLnBrk="0" hangingPunct="1">
+              <a:lnSpc>
+                <a:spcPct val="90000"/>
+              </a:lnSpc>
+              <a:spcBef>
+                <a:spcPts val="500"/>
+              </a:spcBef>
+              <a:buFont typeface="Arial" panose="020B0604020202020204" pitchFamily="34" charset="0"/>
+              <a:buNone/>
+              <a:defRPr sz="1600" kern="1200">
+                <a:solidFill>
+                  <a:schemeClr val="tx1"/>
+                </a:solidFill>
+                <a:latin typeface="+mn-lt"/>
+                <a:ea typeface="+mn-ea"/>
+                <a:cs typeface="+mn-cs"/>
+              </a:defRPr>
+            </a:lvl5pPr>
+            <a:lvl6pPr marL="2286000" indent="0" algn="ctr" defTabSz="914400" rtl="0" eaLnBrk="1" latinLnBrk="0" hangingPunct="1">
+              <a:lnSpc>
+                <a:spcPct val="90000"/>
+              </a:lnSpc>
+              <a:spcBef>
+                <a:spcPts val="500"/>
+              </a:spcBef>
+              <a:buFont typeface="Arial" panose="020B0604020202020204" pitchFamily="34" charset="0"/>
+              <a:buNone/>
+              <a:defRPr sz="1600" kern="1200">
+                <a:solidFill>
+                  <a:schemeClr val="tx1"/>
+                </a:solidFill>
+                <a:latin typeface="+mn-lt"/>
+                <a:ea typeface="+mn-ea"/>
+                <a:cs typeface="+mn-cs"/>
+              </a:defRPr>
+            </a:lvl6pPr>
+            <a:lvl7pPr marL="2743200" indent="0" algn="ctr" defTabSz="914400" rtl="0" eaLnBrk="1" latinLnBrk="0" hangingPunct="1">
+              <a:lnSpc>
+                <a:spcPct val="90000"/>
+              </a:lnSpc>
+              <a:spcBef>
+                <a:spcPts val="500"/>
+              </a:spcBef>
+              <a:buFont typeface="Arial" panose="020B0604020202020204" pitchFamily="34" charset="0"/>
+              <a:buNone/>
+              <a:defRPr sz="1600" kern="1200">
+                <a:solidFill>
+                  <a:schemeClr val="tx1"/>
+                </a:solidFill>
+                <a:latin typeface="+mn-lt"/>
+                <a:ea typeface="+mn-ea"/>
+                <a:cs typeface="+mn-cs"/>
+              </a:defRPr>
+            </a:lvl7pPr>
+            <a:lvl8pPr marL="3200400" indent="0" algn="ctr" defTabSz="914400" rtl="0" eaLnBrk="1" latinLnBrk="0" hangingPunct="1">
+              <a:lnSpc>
+                <a:spcPct val="90000"/>
+              </a:lnSpc>
+              <a:spcBef>
+                <a:spcPts val="500"/>
+              </a:spcBef>
+              <a:buFont typeface="Arial" panose="020B0604020202020204" pitchFamily="34" charset="0"/>
+              <a:buNone/>
+              <a:defRPr sz="1600" kern="1200">
+                <a:solidFill>
+                  <a:schemeClr val="tx1"/>
+                </a:solidFill>
+                <a:latin typeface="+mn-lt"/>
+                <a:ea typeface="+mn-ea"/>
+                <a:cs typeface="+mn-cs"/>
+              </a:defRPr>
+            </a:lvl8pPr>
+            <a:lvl9pPr marL="3657600" indent="0" algn="ctr" defTabSz="914400" rtl="0" eaLnBrk="1" latinLnBrk="0" hangingPunct="1">
+              <a:lnSpc>
+                <a:spcPct val="90000"/>
+              </a:lnSpc>
+              <a:spcBef>
+                <a:spcPts val="500"/>
+              </a:spcBef>
+              <a:buFont typeface="Arial" panose="020B0604020202020204" pitchFamily="34" charset="0"/>
+              <a:buNone/>
+              <a:defRPr sz="1600" kern="1200">
+                <a:solidFill>
+                  <a:schemeClr val="tx1"/>
+                </a:solidFill>
+                <a:latin typeface="+mn-lt"/>
+                <a:ea typeface="+mn-ea"/>
+                <a:cs typeface="+mn-cs"/>
+              </a:defRPr>
+            </a:lvl9pPr>
+          </a:lstStyle>
+          <a:p>
+            <a:pPr lvl="1" algn="l"/>
+            <a:endParaRPr lang="en-US" b="1" dirty="0">
+              <a:solidFill>
+                <a:schemeClr val="accent2">
+                  <a:lumMod val="75000"/>
+                </a:schemeClr>
+              </a:solidFill>
+            </a:endParaRPr>
+          </a:p>
+          <a:p>
+            <a:pPr lvl="2" algn="l"/>
+            <a:endParaRPr lang="en-US" dirty="0"/>
+          </a:p>
+          <a:p>
+            <a:pPr lvl="2" algn="l"/>
+            <a:endParaRPr lang="en-US" dirty="0"/>
+          </a:p>
+          <a:p>
+            <a:pPr lvl="2" algn="l"/>
+            <a:endParaRPr lang="en-US" dirty="0"/>
+          </a:p>
+          <a:p>
+            <a:pPr lvl="2" algn="l"/>
+            <a:endParaRPr lang="en-US" dirty="0"/>
+          </a:p>
+        </p:txBody>
+      </p:sp>
+      <p:sp>
+        <p:nvSpPr>
+          <p:cNvPr id="8" name="Date Placeholder 3">
+            <a:extLst>
+              <a:ext uri="{FF2B5EF4-FFF2-40B4-BE49-F238E27FC236}">
+                <a16:creationId xmlns:a16="http://schemas.microsoft.com/office/drawing/2014/main" id="{F58E9A2E-5660-42AC-A637-A1785328783B}"/>
+              </a:ext>
+            </a:extLst>
+          </p:cNvPr>
+          <p:cNvSpPr>
+            <a:spLocks noGrp="1"/>
+          </p:cNvSpPr>
+          <p:nvPr>
+            <p:ph type="dt" sz="half" idx="10"/>
+          </p:nvPr>
+        </p:nvSpPr>
+        <p:spPr>
+          <a:xfrm>
+            <a:off x="838200" y="6356350"/>
+            <a:ext cx="2743200" cy="365125"/>
+          </a:xfrm>
+        </p:spPr>
+        <p:txBody>
+          <a:bodyPr/>
+          <a:lstStyle>
+            <a:lvl1pPr>
+              <a:defRPr>
+                <a:solidFill>
+                  <a:schemeClr val="tx1">
+                    <a:lumMod val="75000"/>
+                    <a:lumOff val="25000"/>
+                  </a:schemeClr>
+                </a:solidFill>
+              </a:defRPr>
+            </a:lvl1pPr>
+          </a:lstStyle>
+          <a:p>
+            <a:fld id="{F33E6DB1-1B46-4A9E-9DE0-FB3EA5E49B16}" type="datetimeFigureOut">
+              <a:rPr lang="en-US" smtClean="0"/>
+              <a:pPr/>
+              <a:t>6/12/18</a:t>
+            </a:fld>
+            <a:endParaRPr lang="en-US" dirty="0"/>
+          </a:p>
+        </p:txBody>
+      </p:sp>
+      <p:sp>
+        <p:nvSpPr>
+          <p:cNvPr id="9" name="Footer Placeholder 4">
+            <a:extLst>
+              <a:ext uri="{FF2B5EF4-FFF2-40B4-BE49-F238E27FC236}">
+                <a16:creationId xmlns:a16="http://schemas.microsoft.com/office/drawing/2014/main" id="{85AF6068-7533-4FF4-98FF-4FC28EA91E84}"/>
+              </a:ext>
+            </a:extLst>
+          </p:cNvPr>
+          <p:cNvSpPr>
+            <a:spLocks noGrp="1"/>
+          </p:cNvSpPr>
+          <p:nvPr>
+            <p:ph type="ftr" sz="quarter" idx="11"/>
+          </p:nvPr>
+        </p:nvSpPr>
+        <p:spPr>
+          <a:xfrm>
+            <a:off x="4038600" y="6356350"/>
+            <a:ext cx="4114800" cy="365125"/>
+          </a:xfrm>
+        </p:spPr>
+        <p:txBody>
+          <a:bodyPr/>
+          <a:lstStyle>
+            <a:lvl1pPr>
+              <a:defRPr>
+                <a:solidFill>
+                  <a:schemeClr val="tx1">
+                    <a:lumMod val="75000"/>
+                    <a:lumOff val="25000"/>
+                  </a:schemeClr>
+                </a:solidFill>
+              </a:defRPr>
+            </a:lvl1pPr>
+          </a:lstStyle>
+          <a:p>
+            <a:r>
+              <a:rPr lang="en-US" dirty="0"/>
+              <a:t>Crime in Chicago, A Socioeconomic Exploration</a:t>
+            </a:r>
+          </a:p>
+        </p:txBody>
+      </p:sp>
+      <p:sp>
+        <p:nvSpPr>
+          <p:cNvPr id="10" name="Slide Number Placeholder 5">
+            <a:extLst>
+              <a:ext uri="{FF2B5EF4-FFF2-40B4-BE49-F238E27FC236}">
+                <a16:creationId xmlns:a16="http://schemas.microsoft.com/office/drawing/2014/main" id="{8BEE74A5-734B-4BE0-B9D3-3B92252AA9B6}"/>
+              </a:ext>
+            </a:extLst>
+          </p:cNvPr>
+          <p:cNvSpPr>
+            <a:spLocks noGrp="1"/>
+          </p:cNvSpPr>
+          <p:nvPr>
+            <p:ph type="sldNum" sz="quarter" idx="12"/>
+          </p:nvPr>
+        </p:nvSpPr>
+        <p:spPr>
+          <a:xfrm>
+            <a:off x="8610600" y="6356350"/>
+            <a:ext cx="2743200" cy="365125"/>
+          </a:xfrm>
+        </p:spPr>
+        <p:txBody>
+          <a:bodyPr/>
+          <a:lstStyle>
+            <a:lvl1pPr>
+              <a:defRPr>
+                <a:solidFill>
+                  <a:schemeClr val="tx1">
+                    <a:lumMod val="75000"/>
+                    <a:lumOff val="25000"/>
+                  </a:schemeClr>
+                </a:solidFill>
+              </a:defRPr>
+            </a:lvl1pPr>
+          </a:lstStyle>
+          <a:p>
+            <a:fld id="{EB4E44DA-0EBF-471F-933A-3B031DA38E14}" type="slidenum">
+              <a:rPr lang="en-US" smtClean="0"/>
+              <a:pPr/>
+              <a:t>11</a:t>
+            </a:fld>
+            <a:endParaRPr lang="en-US" dirty="0"/>
+          </a:p>
+        </p:txBody>
+      </p:sp>
+      <p:pic>
+        <p:nvPicPr>
+          <p:cNvPr id="3" name="Picture 2">
+            <a:extLst>
+              <a:ext uri="{FF2B5EF4-FFF2-40B4-BE49-F238E27FC236}">
+                <a16:creationId xmlns:a16="http://schemas.microsoft.com/office/drawing/2014/main" id="{3A528789-8063-3348-918A-19DA7E4F7AEF}"/>
+              </a:ext>
+            </a:extLst>
+          </p:cNvPr>
+          <p:cNvPicPr>
+            <a:picLocks noChangeAspect="1"/>
+          </p:cNvPicPr>
+          <p:nvPr/>
+        </p:nvPicPr>
+        <p:blipFill>
+          <a:blip r:embed="rId2">
+            <a:extLst>
+              <a:ext uri="{28A0092B-C50C-407E-A947-70E740481C1C}">
+                <a14:useLocalDpi xmlns:a14="http://schemas.microsoft.com/office/drawing/2010/main" val="0"/>
+              </a:ext>
+            </a:extLst>
+          </a:blip>
+          <a:stretch>
+            <a:fillRect/>
+          </a:stretch>
+        </p:blipFill>
+        <p:spPr>
+          <a:xfrm>
+            <a:off x="1472541" y="1157886"/>
+            <a:ext cx="9322130" cy="5700114"/>
+          </a:xfrm>
+          <a:prstGeom prst="rect">
+            <a:avLst/>
+          </a:prstGeom>
+        </p:spPr>
+      </p:pic>
+    </p:spTree>
+    <p:extLst>
+      <p:ext uri="{BB962C8B-B14F-4D97-AF65-F5344CB8AC3E}">
+        <p14:creationId xmlns:p14="http://schemas.microsoft.com/office/powerpoint/2010/main" val="2316321930"/>
+      </p:ext>
+    </p:extLst>
+  </p:cSld>
+  <p:clrMapOvr>
+    <a:masterClrMapping/>
+  </p:clrMapOvr>
+  <mc:AlternateContent xmlns:mc="http://schemas.openxmlformats.org/markup-compatibility/2006" xmlns:p14="http://schemas.microsoft.com/office/powerpoint/2010/main">
+    <mc:Choice Requires="p14">
+      <p:transition spd="med" p14:dur="550">
+        <p:fade/>
+      </p:transition>
+    </mc:Choice>
+    <mc:Fallback xmlns="">
+      <p:transition spd="med">
+        <p:fade/>
+      </p:transition>
+    </mc:Fallback>
+  </mc:AlternateContent>
+</p:sld>
+</file>
+
+<file path=ppt/slides/slide12.xml><?xml version="1.0" encoding="utf-8"?>
+<p:sld xmlns:a="http://schemas.openxmlformats.org/drawingml/2006/main" xmlns:r="http://schemas.openxmlformats.org/officeDocument/2006/relationships" xmlns:p="http://schemas.openxmlformats.org/presentationml/2006/main">
+  <p:cSld>
+    <p:spTree>
+      <p:nvGrpSpPr>
+        <p:cNvPr id="1" name=""/>
+        <p:cNvGrpSpPr/>
+        <p:nvPr/>
+      </p:nvGrpSpPr>
+      <p:grpSpPr>
+        <a:xfrm>
+          <a:off x="0" y="0"/>
+          <a:ext cx="0" cy="0"/>
+          <a:chOff x="0" y="0"/>
+          <a:chExt cx="0" cy="0"/>
+        </a:xfrm>
+      </p:grpSpPr>
+      <p:sp>
+        <p:nvSpPr>
+          <p:cNvPr id="6" name="Title Placeholder 1">
+            <a:extLst>
+              <a:ext uri="{FF2B5EF4-FFF2-40B4-BE49-F238E27FC236}">
+                <a16:creationId xmlns:a16="http://schemas.microsoft.com/office/drawing/2014/main" id="{0B90DA6A-C92C-4324-A8B3-E2A135292587}"/>
+              </a:ext>
+            </a:extLst>
+          </p:cNvPr>
+          <p:cNvSpPr txBox="1">
+            <a:spLocks/>
+          </p:cNvSpPr>
+          <p:nvPr/>
+        </p:nvSpPr>
+        <p:spPr>
+          <a:xfrm>
+            <a:off x="838200" y="365125"/>
+            <a:ext cx="10515600" cy="1325563"/>
+          </a:xfrm>
+          <a:prstGeom prst="rect">
+            <a:avLst/>
+          </a:prstGeom>
+        </p:spPr>
+        <p:txBody>
+          <a:bodyPr vert="horz" lIns="91440" tIns="45720" rIns="91440" bIns="45720" rtlCol="0" anchor="ctr">
+            <a:normAutofit/>
+          </a:bodyPr>
+          <a:lstStyle>
+            <a:lvl1pPr algn="ctr" defTabSz="914400" rtl="0" eaLnBrk="1" latinLnBrk="0" hangingPunct="1">
+              <a:lnSpc>
+                <a:spcPct val="90000"/>
+              </a:lnSpc>
+              <a:spcBef>
+                <a:spcPct val="0"/>
+              </a:spcBef>
+              <a:buNone/>
+              <a:defRPr sz="6000" kern="1200">
+                <a:solidFill>
+                  <a:schemeClr val="tx1"/>
+                </a:solidFill>
+                <a:latin typeface="+mj-lt"/>
+                <a:ea typeface="+mj-ea"/>
+                <a:cs typeface="+mj-cs"/>
+              </a:defRPr>
+            </a:lvl1pPr>
+          </a:lstStyle>
+          <a:p>
+            <a:r>
+              <a:rPr lang="en-US" dirty="0"/>
+              <a:t>New Slide</a:t>
+            </a:r>
+          </a:p>
+        </p:txBody>
+      </p:sp>
+      <p:sp>
+        <p:nvSpPr>
+          <p:cNvPr id="7" name="Text Placeholder 2">
+            <a:extLst>
+              <a:ext uri="{FF2B5EF4-FFF2-40B4-BE49-F238E27FC236}">
+                <a16:creationId xmlns:a16="http://schemas.microsoft.com/office/drawing/2014/main" id="{9167F074-A973-485B-8298-94398C48095C}"/>
+              </a:ext>
+            </a:extLst>
+          </p:cNvPr>
+          <p:cNvSpPr txBox="1">
+            <a:spLocks/>
+          </p:cNvSpPr>
+          <p:nvPr/>
+        </p:nvSpPr>
+        <p:spPr>
+          <a:xfrm>
+            <a:off x="838200" y="1825625"/>
+            <a:ext cx="10515600" cy="4351338"/>
+          </a:xfrm>
+          <a:prstGeom prst="rect">
+            <a:avLst/>
+          </a:prstGeom>
+        </p:spPr>
+        <p:txBody>
+          <a:bodyPr vert="horz" lIns="91440" tIns="45720" rIns="91440" bIns="45720" rtlCol="0">
+            <a:normAutofit/>
+          </a:bodyPr>
+          <a:lstStyle>
+            <a:lvl1pPr marL="0" indent="0" algn="ctr" defTabSz="914400" rtl="0" eaLnBrk="1" latinLnBrk="0" hangingPunct="1">
+              <a:lnSpc>
+                <a:spcPct val="90000"/>
+              </a:lnSpc>
+              <a:spcBef>
+                <a:spcPts val="1000"/>
+              </a:spcBef>
+              <a:buFont typeface="Arial" panose="020B0604020202020204" pitchFamily="34" charset="0"/>
+              <a:buNone/>
+              <a:defRPr sz="2400" kern="1200">
+                <a:solidFill>
+                  <a:schemeClr val="tx1"/>
+                </a:solidFill>
+                <a:latin typeface="+mn-lt"/>
+                <a:ea typeface="+mn-ea"/>
+                <a:cs typeface="+mn-cs"/>
+              </a:defRPr>
+            </a:lvl1pPr>
+            <a:lvl2pPr marL="457200" indent="0" algn="ctr" defTabSz="914400" rtl="0" eaLnBrk="1" latinLnBrk="0" hangingPunct="1">
+              <a:lnSpc>
+                <a:spcPct val="90000"/>
+              </a:lnSpc>
+              <a:spcBef>
+                <a:spcPts val="500"/>
+              </a:spcBef>
+              <a:buFont typeface="Arial" panose="020B0604020202020204" pitchFamily="34" charset="0"/>
+              <a:buNone/>
+              <a:defRPr sz="2000" kern="1200">
+                <a:solidFill>
+                  <a:schemeClr val="tx1"/>
+                </a:solidFill>
+                <a:latin typeface="+mn-lt"/>
+                <a:ea typeface="+mn-ea"/>
+                <a:cs typeface="+mn-cs"/>
+              </a:defRPr>
+            </a:lvl2pPr>
+            <a:lvl3pPr marL="914400" indent="0" algn="ctr" defTabSz="914400" rtl="0" eaLnBrk="1" latinLnBrk="0" hangingPunct="1">
+              <a:lnSpc>
+                <a:spcPct val="90000"/>
+              </a:lnSpc>
+              <a:spcBef>
+                <a:spcPts val="500"/>
+              </a:spcBef>
+              <a:buFont typeface="Arial" panose="020B0604020202020204" pitchFamily="34" charset="0"/>
+              <a:buNone/>
+              <a:defRPr sz="1800" kern="1200">
+                <a:solidFill>
+                  <a:schemeClr val="tx1"/>
+                </a:solidFill>
+                <a:latin typeface="+mn-lt"/>
+                <a:ea typeface="+mn-ea"/>
+                <a:cs typeface="+mn-cs"/>
+              </a:defRPr>
+            </a:lvl3pPr>
+            <a:lvl4pPr marL="1371600" indent="0" algn="ctr" defTabSz="914400" rtl="0" eaLnBrk="1" latinLnBrk="0" hangingPunct="1">
+              <a:lnSpc>
+                <a:spcPct val="90000"/>
+              </a:lnSpc>
+              <a:spcBef>
+                <a:spcPts val="500"/>
+              </a:spcBef>
+              <a:buFont typeface="Arial" panose="020B0604020202020204" pitchFamily="34" charset="0"/>
+              <a:buNone/>
+              <a:defRPr sz="1600" kern="1200">
+                <a:solidFill>
+                  <a:schemeClr val="tx1"/>
+                </a:solidFill>
+                <a:latin typeface="+mn-lt"/>
+                <a:ea typeface="+mn-ea"/>
+                <a:cs typeface="+mn-cs"/>
+              </a:defRPr>
+            </a:lvl4pPr>
+            <a:lvl5pPr marL="1828800" indent="0" algn="ctr" defTabSz="914400" rtl="0" eaLnBrk="1" latinLnBrk="0" hangingPunct="1">
+              <a:lnSpc>
+                <a:spcPct val="90000"/>
+              </a:lnSpc>
+              <a:spcBef>
+                <a:spcPts val="500"/>
+              </a:spcBef>
+              <a:buFont typeface="Arial" panose="020B0604020202020204" pitchFamily="34" charset="0"/>
+              <a:buNone/>
+              <a:defRPr sz="1600" kern="1200">
+                <a:solidFill>
+                  <a:schemeClr val="tx1"/>
+                </a:solidFill>
+                <a:latin typeface="+mn-lt"/>
+                <a:ea typeface="+mn-ea"/>
+                <a:cs typeface="+mn-cs"/>
+              </a:defRPr>
+            </a:lvl5pPr>
+            <a:lvl6pPr marL="2286000" indent="0" algn="ctr" defTabSz="914400" rtl="0" eaLnBrk="1" latinLnBrk="0" hangingPunct="1">
+              <a:lnSpc>
+                <a:spcPct val="90000"/>
+              </a:lnSpc>
+              <a:spcBef>
+                <a:spcPts val="500"/>
+              </a:spcBef>
+              <a:buFont typeface="Arial" panose="020B0604020202020204" pitchFamily="34" charset="0"/>
+              <a:buNone/>
+              <a:defRPr sz="1600" kern="1200">
+                <a:solidFill>
+                  <a:schemeClr val="tx1"/>
+                </a:solidFill>
+                <a:latin typeface="+mn-lt"/>
+                <a:ea typeface="+mn-ea"/>
+                <a:cs typeface="+mn-cs"/>
+              </a:defRPr>
+            </a:lvl6pPr>
+            <a:lvl7pPr marL="2743200" indent="0" algn="ctr" defTabSz="914400" rtl="0" eaLnBrk="1" latinLnBrk="0" hangingPunct="1">
+              <a:lnSpc>
+                <a:spcPct val="90000"/>
+              </a:lnSpc>
+              <a:spcBef>
+                <a:spcPts val="500"/>
+              </a:spcBef>
+              <a:buFont typeface="Arial" panose="020B0604020202020204" pitchFamily="34" charset="0"/>
+              <a:buNone/>
+              <a:defRPr sz="1600" kern="1200">
+                <a:solidFill>
+                  <a:schemeClr val="tx1"/>
+                </a:solidFill>
+                <a:latin typeface="+mn-lt"/>
+                <a:ea typeface="+mn-ea"/>
+                <a:cs typeface="+mn-cs"/>
+              </a:defRPr>
+            </a:lvl7pPr>
+            <a:lvl8pPr marL="3200400" indent="0" algn="ctr" defTabSz="914400" rtl="0" eaLnBrk="1" latinLnBrk="0" hangingPunct="1">
+              <a:lnSpc>
+                <a:spcPct val="90000"/>
+              </a:lnSpc>
+              <a:spcBef>
+                <a:spcPts val="500"/>
+              </a:spcBef>
+              <a:buFont typeface="Arial" panose="020B0604020202020204" pitchFamily="34" charset="0"/>
+              <a:buNone/>
+              <a:defRPr sz="1600" kern="1200">
+                <a:solidFill>
+                  <a:schemeClr val="tx1"/>
+                </a:solidFill>
+                <a:latin typeface="+mn-lt"/>
+                <a:ea typeface="+mn-ea"/>
+                <a:cs typeface="+mn-cs"/>
+              </a:defRPr>
+            </a:lvl8pPr>
+            <a:lvl9pPr marL="3657600" indent="0" algn="ctr" defTabSz="914400" rtl="0" eaLnBrk="1" latinLnBrk="0" hangingPunct="1">
+              <a:lnSpc>
+                <a:spcPct val="90000"/>
+              </a:lnSpc>
+              <a:spcBef>
+                <a:spcPts val="500"/>
+              </a:spcBef>
+              <a:buFont typeface="Arial" panose="020B0604020202020204" pitchFamily="34" charset="0"/>
+              <a:buNone/>
+              <a:defRPr sz="1600" kern="1200">
+                <a:solidFill>
+                  <a:schemeClr val="tx1"/>
+                </a:solidFill>
+                <a:latin typeface="+mn-lt"/>
+                <a:ea typeface="+mn-ea"/>
+                <a:cs typeface="+mn-cs"/>
+              </a:defRPr>
+            </a:lvl9pPr>
+          </a:lstStyle>
+          <a:p>
+            <a:pPr algn="l"/>
+            <a:r>
+              <a:rPr lang="en-US" dirty="0"/>
+              <a:t>Grouping 1</a:t>
+            </a:r>
+          </a:p>
+          <a:p>
+            <a:pPr lvl="1" algn="l"/>
+            <a:r>
+              <a:rPr lang="en-US" dirty="0"/>
+              <a:t>Grouping 2</a:t>
+            </a:r>
+          </a:p>
+          <a:p>
+            <a:pPr lvl="2" algn="l"/>
+            <a:r>
+              <a:rPr lang="en-US" dirty="0"/>
+              <a:t>Grouping 3</a:t>
+            </a:r>
+          </a:p>
+        </p:txBody>
+      </p:sp>
+      <p:sp>
+        <p:nvSpPr>
+          <p:cNvPr id="8" name="Date Placeholder 3">
+            <a:extLst>
+              <a:ext uri="{FF2B5EF4-FFF2-40B4-BE49-F238E27FC236}">
+                <a16:creationId xmlns:a16="http://schemas.microsoft.com/office/drawing/2014/main" id="{F58E9A2E-5660-42AC-A637-A1785328783B}"/>
+              </a:ext>
+            </a:extLst>
+          </p:cNvPr>
+          <p:cNvSpPr>
+            <a:spLocks noGrp="1"/>
+          </p:cNvSpPr>
+          <p:nvPr>
+            <p:ph type="dt" sz="half" idx="10"/>
+          </p:nvPr>
+        </p:nvSpPr>
+        <p:spPr>
+          <a:xfrm>
+            <a:off x="838200" y="6356350"/>
+            <a:ext cx="2743200" cy="365125"/>
+          </a:xfrm>
+        </p:spPr>
+        <p:txBody>
+          <a:bodyPr/>
+          <a:lstStyle>
+            <a:lvl1pPr>
+              <a:defRPr>
+                <a:solidFill>
+                  <a:schemeClr val="tx1">
+                    <a:lumMod val="75000"/>
+                    <a:lumOff val="25000"/>
+                  </a:schemeClr>
+                </a:solidFill>
+              </a:defRPr>
+            </a:lvl1pPr>
+          </a:lstStyle>
+          <a:p>
+            <a:fld id="{F33E6DB1-1B46-4A9E-9DE0-FB3EA5E49B16}" type="datetimeFigureOut">
+              <a:rPr lang="en-US" smtClean="0"/>
+              <a:pPr/>
+              <a:t>6/12/18</a:t>
+            </a:fld>
+            <a:endParaRPr lang="en-US" dirty="0"/>
+          </a:p>
+        </p:txBody>
+      </p:sp>
+      <p:sp>
+        <p:nvSpPr>
+          <p:cNvPr id="9" name="Footer Placeholder 4">
+            <a:extLst>
+              <a:ext uri="{FF2B5EF4-FFF2-40B4-BE49-F238E27FC236}">
+                <a16:creationId xmlns:a16="http://schemas.microsoft.com/office/drawing/2014/main" id="{85AF6068-7533-4FF4-98FF-4FC28EA91E84}"/>
+              </a:ext>
+            </a:extLst>
+          </p:cNvPr>
+          <p:cNvSpPr>
+            <a:spLocks noGrp="1"/>
+          </p:cNvSpPr>
+          <p:nvPr>
+            <p:ph type="ftr" sz="quarter" idx="11"/>
+          </p:nvPr>
+        </p:nvSpPr>
+        <p:spPr>
+          <a:xfrm>
+            <a:off x="4038600" y="6356350"/>
+            <a:ext cx="4114800" cy="365125"/>
+          </a:xfrm>
+        </p:spPr>
+        <p:txBody>
+          <a:bodyPr/>
+          <a:lstStyle>
+            <a:lvl1pPr>
+              <a:defRPr>
+                <a:solidFill>
+                  <a:schemeClr val="tx1">
+                    <a:lumMod val="75000"/>
+                    <a:lumOff val="25000"/>
+                  </a:schemeClr>
+                </a:solidFill>
+              </a:defRPr>
+            </a:lvl1pPr>
+          </a:lstStyle>
+          <a:p>
+            <a:r>
+              <a:rPr lang="en-US" dirty="0"/>
+              <a:t>Crime in Chicago, A Socioeconomic Exploration</a:t>
+            </a:r>
+          </a:p>
+        </p:txBody>
+      </p:sp>
+      <p:sp>
+        <p:nvSpPr>
+          <p:cNvPr id="10" name="Slide Number Placeholder 5">
+            <a:extLst>
+              <a:ext uri="{FF2B5EF4-FFF2-40B4-BE49-F238E27FC236}">
+                <a16:creationId xmlns:a16="http://schemas.microsoft.com/office/drawing/2014/main" id="{8BEE74A5-734B-4BE0-B9D3-3B92252AA9B6}"/>
+              </a:ext>
+            </a:extLst>
+          </p:cNvPr>
+          <p:cNvSpPr>
+            <a:spLocks noGrp="1"/>
+          </p:cNvSpPr>
+          <p:nvPr>
+            <p:ph type="sldNum" sz="quarter" idx="12"/>
+          </p:nvPr>
+        </p:nvSpPr>
+        <p:spPr>
+          <a:xfrm>
+            <a:off x="8610600" y="6356350"/>
+            <a:ext cx="2743200" cy="365125"/>
+          </a:xfrm>
+        </p:spPr>
+        <p:txBody>
+          <a:bodyPr/>
+          <a:lstStyle>
+            <a:lvl1pPr>
+              <a:defRPr>
+                <a:solidFill>
+                  <a:schemeClr val="tx1">
+                    <a:lumMod val="75000"/>
+                    <a:lumOff val="25000"/>
+                  </a:schemeClr>
+                </a:solidFill>
+              </a:defRPr>
+            </a:lvl1pPr>
+          </a:lstStyle>
+          <a:p>
+            <a:fld id="{EB4E44DA-0EBF-471F-933A-3B031DA38E14}" type="slidenum">
+              <a:rPr lang="en-US" smtClean="0"/>
+              <a:pPr/>
+              <a:t>12</a:t>
+            </a:fld>
+            <a:endParaRPr lang="en-US" dirty="0"/>
+          </a:p>
+        </p:txBody>
+      </p:sp>
+    </p:spTree>
+    <p:extLst>
+      <p:ext uri="{BB962C8B-B14F-4D97-AF65-F5344CB8AC3E}">
+        <p14:creationId xmlns:p14="http://schemas.microsoft.com/office/powerpoint/2010/main" val="468515972"/>
+      </p:ext>
+    </p:extLst>
+  </p:cSld>
+  <p:clrMapOvr>
+    <a:masterClrMapping/>
+  </p:clrMapOvr>
+  <mc:AlternateContent xmlns:mc="http://schemas.openxmlformats.org/markup-compatibility/2006" xmlns:p14="http://schemas.microsoft.com/office/powerpoint/2010/main">
+    <mc:Choice Requires="p14">
+      <p:transition spd="med" p14:dur="550">
+        <p:fade/>
+      </p:transition>
+    </mc:Choice>
+    <mc:Fallback xmlns="">
       <p:transition spd="med">
         <p:fade/>
       </p:transition>
@@ -1265,7 +2692,7 @@
             <a:fld id="{F33E6DB1-1B46-4A9E-9DE0-FB3EA5E49B16}" type="datetimeFigureOut">
               <a:rPr lang="en-US" smtClean="0"/>
               <a:pPr/>
-              <a:t>6/11/2018</a:t>
+              <a:t>6/12/18</a:t>
             </a:fld>
             <a:endParaRPr lang="en-US" dirty="0"/>
           </a:p>
@@ -1371,13 +2798,13 @@
   <p:clrMapOvr>
     <a:masterClrMapping/>
   </p:clrMapOvr>
-  <mc:AlternateContent xmlns:mc="http://schemas.openxmlformats.org/markup-compatibility/2006">
-    <mc:Choice xmlns:p14="http://schemas.microsoft.com/office/powerpoint/2010/main" Requires="p14">
+  <mc:AlternateContent xmlns:mc="http://schemas.openxmlformats.org/markup-compatibility/2006" xmlns:p14="http://schemas.microsoft.com/office/powerpoint/2010/main">
+    <mc:Choice Requires="p14">
       <p:transition spd="med" p14:dur="550">
         <p:fade/>
       </p:transition>
     </mc:Choice>
-    <mc:Fallback>
+    <mc:Fallback xmlns="">
       <p:transition spd="med">
         <p:fade/>
       </p:transition>
@@ -1744,7 +3171,7 @@
             <a:fld id="{F33E6DB1-1B46-4A9E-9DE0-FB3EA5E49B16}" type="datetimeFigureOut">
               <a:rPr lang="en-US" smtClean="0"/>
               <a:pPr/>
-              <a:t>6/11/2018</a:t>
+              <a:t>6/12/18</a:t>
             </a:fld>
             <a:endParaRPr lang="en-US" dirty="0"/>
           </a:p>
@@ -1850,13 +3277,13 @@
   <p:clrMapOvr>
     <a:masterClrMapping/>
   </p:clrMapOvr>
-  <mc:AlternateContent xmlns:mc="http://schemas.openxmlformats.org/markup-compatibility/2006">
-    <mc:Choice xmlns:p14="http://schemas.microsoft.com/office/powerpoint/2010/main" Requires="p14">
+  <mc:AlternateContent xmlns:mc="http://schemas.openxmlformats.org/markup-compatibility/2006" xmlns:p14="http://schemas.microsoft.com/office/powerpoint/2010/main">
+    <mc:Choice Requires="p14">
       <p:transition spd="med" p14:dur="550">
         <p:fade/>
       </p:transition>
     </mc:Choice>
-    <mc:Fallback>
+    <mc:Fallback xmlns="">
       <p:transition spd="med">
         <p:fade/>
       </p:transition>
@@ -2404,7 +3831,7 @@
             <a:fld id="{F33E6DB1-1B46-4A9E-9DE0-FB3EA5E49B16}" type="datetimeFigureOut">
               <a:rPr lang="en-US" smtClean="0"/>
               <a:pPr/>
-              <a:t>6/11/2018</a:t>
+              <a:t>6/12/18</a:t>
             </a:fld>
             <a:endParaRPr lang="en-US" dirty="0"/>
           </a:p>
@@ -2510,13 +3937,13 @@
   <p:clrMapOvr>
     <a:masterClrMapping/>
   </p:clrMapOvr>
-  <mc:AlternateContent xmlns:mc="http://schemas.openxmlformats.org/markup-compatibility/2006">
-    <mc:Choice xmlns:p14="http://schemas.microsoft.com/office/powerpoint/2010/main" Requires="p14">
+  <mc:AlternateContent xmlns:mc="http://schemas.openxmlformats.org/markup-compatibility/2006" xmlns:p14="http://schemas.microsoft.com/office/powerpoint/2010/main">
+    <mc:Choice Requires="p14">
       <p:transition spd="med" p14:dur="550">
         <p:fade/>
       </p:transition>
     </mc:Choice>
-    <mc:Fallback>
+    <mc:Fallback xmlns="">
       <p:transition spd="med">
         <p:fade/>
       </p:transition>
@@ -3428,6 +4855,101 @@
       </p:grpSpPr>
       <p:sp>
         <p:nvSpPr>
+          <p:cNvPr id="2" name="Title 1">
+            <a:extLst>
+              <a:ext uri="{FF2B5EF4-FFF2-40B4-BE49-F238E27FC236}">
+                <a16:creationId xmlns:a16="http://schemas.microsoft.com/office/drawing/2014/main" id="{1C7BD500-5502-5A41-857D-289054A92389}"/>
+              </a:ext>
+            </a:extLst>
+          </p:cNvPr>
+          <p:cNvSpPr>
+            <a:spLocks noGrp="1"/>
+          </p:cNvSpPr>
+          <p:nvPr>
+            <p:ph type="ctrTitle"/>
+          </p:nvPr>
+        </p:nvSpPr>
+        <p:spPr/>
+        <p:txBody>
+          <a:bodyPr/>
+          <a:lstStyle/>
+          <a:p>
+            <a:r>
+              <a:rPr lang="en-US" dirty="0"/>
+              <a:t>ANALYSIS</a:t>
+            </a:r>
+          </a:p>
+        </p:txBody>
+      </p:sp>
+      <p:sp>
+        <p:nvSpPr>
+          <p:cNvPr id="3" name="Subtitle 2">
+            <a:extLst>
+              <a:ext uri="{FF2B5EF4-FFF2-40B4-BE49-F238E27FC236}">
+                <a16:creationId xmlns:a16="http://schemas.microsoft.com/office/drawing/2014/main" id="{F9B00AF7-6915-044C-B922-D44ECD2989DF}"/>
+              </a:ext>
+            </a:extLst>
+          </p:cNvPr>
+          <p:cNvSpPr>
+            <a:spLocks noGrp="1"/>
+          </p:cNvSpPr>
+          <p:nvPr>
+            <p:ph type="subTitle" idx="1"/>
+          </p:nvPr>
+        </p:nvSpPr>
+        <p:spPr/>
+        <p:txBody>
+          <a:bodyPr/>
+          <a:lstStyle/>
+          <a:p>
+            <a:endParaRPr lang="en-US" dirty="0"/>
+          </a:p>
+        </p:txBody>
+      </p:sp>
+    </p:spTree>
+    <p:extLst>
+      <p:ext uri="{BB962C8B-B14F-4D97-AF65-F5344CB8AC3E}">
+        <p14:creationId xmlns:p14="http://schemas.microsoft.com/office/powerpoint/2010/main" val="3088197054"/>
+      </p:ext>
+    </p:extLst>
+  </p:cSld>
+  <p:clrMapOvr>
+    <a:masterClrMapping/>
+  </p:clrMapOvr>
+  <mc:AlternateContent xmlns:mc="http://schemas.openxmlformats.org/markup-compatibility/2006" xmlns:p14="http://schemas.microsoft.com/office/powerpoint/2010/main">
+    <mc:Choice Requires="p14">
+      <p:transition spd="med" p14:dur="550">
+        <p:fade/>
+      </p:transition>
+    </mc:Choice>
+    <mc:Fallback xmlns="">
+      <p:transition spd="med">
+        <p:fade/>
+      </p:transition>
+    </mc:Fallback>
+  </mc:AlternateContent>
+</p:sld>
+</file>
+
+<file path=ppt/slides/slide6.xml><?xml version="1.0" encoding="utf-8"?>
+<p:sld xmlns:a="http://schemas.openxmlformats.org/drawingml/2006/main" xmlns:r="http://schemas.openxmlformats.org/officeDocument/2006/relationships" xmlns:p="http://schemas.openxmlformats.org/presentationml/2006/main">
+  <p:cSld>
+    <p:spTree>
+      <p:nvGrpSpPr>
+        <p:cNvPr id="1" name=""/>
+        <p:cNvGrpSpPr/>
+        <p:nvPr/>
+      </p:nvGrpSpPr>
+      <p:grpSpPr>
+        <a:xfrm>
+          <a:off x="0" y="0"/>
+          <a:ext cx="0" cy="0"/>
+          <a:chOff x="0" y="0"/>
+          <a:chExt cx="0" cy="0"/>
+        </a:xfrm>
+      </p:grpSpPr>
+      <p:sp>
+        <p:nvSpPr>
           <p:cNvPr id="6" name="Title Placeholder 1">
             <a:extLst>
               <a:ext uri="{FF2B5EF4-FFF2-40B4-BE49-F238E27FC236}">
@@ -3451,7 +4973,7 @@
         </p:spPr>
         <p:txBody>
           <a:bodyPr vert="horz" lIns="91440" tIns="45720" rIns="91440" bIns="45720" rtlCol="0" anchor="ctr">
-            <a:normAutofit/>
+            <a:normAutofit fontScale="92500" lnSpcReduction="20000"/>
           </a:bodyPr>
           <a:lstStyle>
             <a:lvl1pPr algn="ctr" defTabSz="914400" rtl="0" eaLnBrk="1" latinLnBrk="0" hangingPunct="1">
@@ -3475,7 +4997,7 @@
           <a:p>
             <a:r>
               <a:rPr lang="en-US" dirty="0"/>
-              <a:t>New Slide</a:t>
+              <a:t>Crime in Chicago through the course of time</a:t>
             </a:r>
           </a:p>
         </p:txBody>
@@ -3672,25 +5194,30 @@
             </a:lvl9pPr>
           </a:lstStyle>
           <a:p>
-            <a:pPr algn="l"/>
-            <a:r>
-              <a:rPr lang="en-US" dirty="0"/>
-              <a:t>Grouping 1</a:t>
-            </a:r>
-          </a:p>
-          <a:p>
             <a:pPr lvl="1" algn="l"/>
-            <a:r>
-              <a:rPr lang="en-US" dirty="0"/>
-              <a:t>Grouping 2</a:t>
-            </a:r>
+            <a:endParaRPr lang="en-US" b="1" dirty="0">
+              <a:solidFill>
+                <a:schemeClr val="accent2">
+                  <a:lumMod val="75000"/>
+                </a:schemeClr>
+              </a:solidFill>
+            </a:endParaRPr>
           </a:p>
           <a:p>
             <a:pPr lvl="2" algn="l"/>
-            <a:r>
-              <a:rPr lang="en-US" dirty="0"/>
-              <a:t>Grouping 3</a:t>
-            </a:r>
+            <a:endParaRPr lang="en-US" dirty="0"/>
+          </a:p>
+          <a:p>
+            <a:pPr lvl="2" algn="l"/>
+            <a:endParaRPr lang="en-US" dirty="0"/>
+          </a:p>
+          <a:p>
+            <a:pPr lvl="2" algn="l"/>
+            <a:endParaRPr lang="en-US" dirty="0"/>
+          </a:p>
+          <a:p>
+            <a:pPr lvl="2" algn="l"/>
+            <a:endParaRPr lang="en-US" dirty="0"/>
           </a:p>
         </p:txBody>
       </p:sp>
@@ -3734,7 +5261,7 @@
             <a:fld id="{F33E6DB1-1B46-4A9E-9DE0-FB3EA5E49B16}" type="datetimeFigureOut">
               <a:rPr lang="en-US" smtClean="0"/>
               <a:pPr/>
-              <a:t>6/11/2018</a:t>
+              <a:t>6/12/18</a:t>
             </a:fld>
             <a:endParaRPr lang="en-US" dirty="0"/>
           </a:p>
@@ -3824,29 +5351,1562 @@
             <a:fld id="{EB4E44DA-0EBF-471F-933A-3B031DA38E14}" type="slidenum">
               <a:rPr lang="en-US" smtClean="0"/>
               <a:pPr/>
-              <a:t>5</a:t>
+              <a:t>6</a:t>
             </a:fld>
             <a:endParaRPr lang="en-US" dirty="0"/>
           </a:p>
         </p:txBody>
       </p:sp>
+      <p:pic>
+        <p:nvPicPr>
+          <p:cNvPr id="12" name="Picture 11">
+            <a:extLst>
+              <a:ext uri="{FF2B5EF4-FFF2-40B4-BE49-F238E27FC236}">
+                <a16:creationId xmlns:a16="http://schemas.microsoft.com/office/drawing/2014/main" id="{765E1E1D-2508-504F-9386-26DC0C52A161}"/>
+              </a:ext>
+            </a:extLst>
+          </p:cNvPr>
+          <p:cNvPicPr>
+            <a:picLocks noChangeAspect="1"/>
+          </p:cNvPicPr>
+          <p:nvPr/>
+        </p:nvPicPr>
+        <p:blipFill>
+          <a:blip r:embed="rId2">
+            <a:extLst>
+              <a:ext uri="{28A0092B-C50C-407E-A947-70E740481C1C}">
+                <a14:useLocalDpi xmlns:a14="http://schemas.microsoft.com/office/drawing/2010/main" val="0"/>
+              </a:ext>
+            </a:extLst>
+          </a:blip>
+          <a:stretch>
+            <a:fillRect/>
+          </a:stretch>
+        </p:blipFill>
+        <p:spPr>
+          <a:xfrm>
+            <a:off x="0" y="1712121"/>
+            <a:ext cx="6343650" cy="4008437"/>
+          </a:xfrm>
+          <a:prstGeom prst="rect">
+            <a:avLst/>
+          </a:prstGeom>
+        </p:spPr>
+      </p:pic>
+      <p:pic>
+        <p:nvPicPr>
+          <p:cNvPr id="14" name="Picture 13">
+            <a:extLst>
+              <a:ext uri="{FF2B5EF4-FFF2-40B4-BE49-F238E27FC236}">
+                <a16:creationId xmlns:a16="http://schemas.microsoft.com/office/drawing/2014/main" id="{D91D543D-9F5A-CC4F-94DF-1720A32FCD1F}"/>
+              </a:ext>
+            </a:extLst>
+          </p:cNvPr>
+          <p:cNvPicPr>
+            <a:picLocks noChangeAspect="1"/>
+          </p:cNvPicPr>
+          <p:nvPr/>
+        </p:nvPicPr>
+        <p:blipFill>
+          <a:blip r:embed="rId3">
+            <a:extLst>
+              <a:ext uri="{28A0092B-C50C-407E-A947-70E740481C1C}">
+                <a14:useLocalDpi xmlns:a14="http://schemas.microsoft.com/office/drawing/2010/main" val="0"/>
+              </a:ext>
+            </a:extLst>
+          </a:blip>
+          <a:stretch>
+            <a:fillRect/>
+          </a:stretch>
+        </p:blipFill>
+        <p:spPr>
+          <a:xfrm>
+            <a:off x="5972176" y="1804192"/>
+            <a:ext cx="6219824" cy="3781426"/>
+          </a:xfrm>
+          <a:prstGeom prst="rect">
+            <a:avLst/>
+          </a:prstGeom>
+        </p:spPr>
+      </p:pic>
     </p:spTree>
     <p:extLst>
       <p:ext uri="{BB962C8B-B14F-4D97-AF65-F5344CB8AC3E}">
-        <p14:creationId xmlns:p14="http://schemas.microsoft.com/office/powerpoint/2010/main" val="468515972"/>
+        <p14:creationId xmlns:p14="http://schemas.microsoft.com/office/powerpoint/2010/main" val="799976865"/>
       </p:ext>
     </p:extLst>
   </p:cSld>
   <p:clrMapOvr>
     <a:masterClrMapping/>
   </p:clrMapOvr>
-  <mc:AlternateContent xmlns:mc="http://schemas.openxmlformats.org/markup-compatibility/2006">
-    <mc:Choice xmlns:p14="http://schemas.microsoft.com/office/powerpoint/2010/main" Requires="p14">
+  <mc:AlternateContent xmlns:mc="http://schemas.openxmlformats.org/markup-compatibility/2006" xmlns:p14="http://schemas.microsoft.com/office/powerpoint/2010/main">
+    <mc:Choice Requires="p14">
       <p:transition spd="med" p14:dur="550">
         <p:fade/>
       </p:transition>
     </mc:Choice>
-    <mc:Fallback>
+    <mc:Fallback xmlns="">
+      <p:transition spd="med">
+        <p:fade/>
+      </p:transition>
+    </mc:Fallback>
+  </mc:AlternateContent>
+</p:sld>
+</file>
+
+<file path=ppt/slides/slide7.xml><?xml version="1.0" encoding="utf-8"?>
+<p:sld xmlns:a="http://schemas.openxmlformats.org/drawingml/2006/main" xmlns:r="http://schemas.openxmlformats.org/officeDocument/2006/relationships" xmlns:p="http://schemas.openxmlformats.org/presentationml/2006/main">
+  <p:cSld>
+    <p:spTree>
+      <p:nvGrpSpPr>
+        <p:cNvPr id="1" name=""/>
+        <p:cNvGrpSpPr/>
+        <p:nvPr/>
+      </p:nvGrpSpPr>
+      <p:grpSpPr>
+        <a:xfrm>
+          <a:off x="0" y="0"/>
+          <a:ext cx="0" cy="0"/>
+          <a:chOff x="0" y="0"/>
+          <a:chExt cx="0" cy="0"/>
+        </a:xfrm>
+      </p:grpSpPr>
+      <p:sp>
+        <p:nvSpPr>
+          <p:cNvPr id="6" name="Title Placeholder 1">
+            <a:extLst>
+              <a:ext uri="{FF2B5EF4-FFF2-40B4-BE49-F238E27FC236}">
+                <a16:creationId xmlns:a16="http://schemas.microsoft.com/office/drawing/2014/main" id="{0B90DA6A-C92C-4324-A8B3-E2A135292587}"/>
+              </a:ext>
+            </a:extLst>
+          </p:cNvPr>
+          <p:cNvSpPr txBox="1">
+            <a:spLocks/>
+          </p:cNvSpPr>
+          <p:nvPr/>
+        </p:nvSpPr>
+        <p:spPr>
+          <a:xfrm>
+            <a:off x="838200" y="365125"/>
+            <a:ext cx="10515600" cy="1325563"/>
+          </a:xfrm>
+          <a:prstGeom prst="rect">
+            <a:avLst/>
+          </a:prstGeom>
+        </p:spPr>
+        <p:txBody>
+          <a:bodyPr vert="horz" lIns="91440" tIns="45720" rIns="91440" bIns="45720" rtlCol="0" anchor="ctr">
+            <a:normAutofit fontScale="92500" lnSpcReduction="20000"/>
+          </a:bodyPr>
+          <a:lstStyle>
+            <a:lvl1pPr algn="ctr" defTabSz="914400" rtl="0" eaLnBrk="1" latinLnBrk="0" hangingPunct="1">
+              <a:lnSpc>
+                <a:spcPct val="90000"/>
+              </a:lnSpc>
+              <a:spcBef>
+                <a:spcPct val="0"/>
+              </a:spcBef>
+              <a:buNone/>
+              <a:defRPr sz="6000" kern="1200">
+                <a:solidFill>
+                  <a:schemeClr val="tx1"/>
+                </a:solidFill>
+                <a:latin typeface="+mj-lt"/>
+                <a:ea typeface="+mj-ea"/>
+                <a:cs typeface="+mj-cs"/>
+              </a:defRPr>
+            </a:lvl1pPr>
+          </a:lstStyle>
+          <a:p>
+            <a:r>
+              <a:rPr lang="en-US" dirty="0"/>
+              <a:t>Crime in Chicago through the course of time</a:t>
+            </a:r>
+          </a:p>
+        </p:txBody>
+      </p:sp>
+      <p:sp>
+        <p:nvSpPr>
+          <p:cNvPr id="7" name="Text Placeholder 2">
+            <a:extLst>
+              <a:ext uri="{FF2B5EF4-FFF2-40B4-BE49-F238E27FC236}">
+                <a16:creationId xmlns:a16="http://schemas.microsoft.com/office/drawing/2014/main" id="{9167F074-A973-485B-8298-94398C48095C}"/>
+              </a:ext>
+            </a:extLst>
+          </p:cNvPr>
+          <p:cNvSpPr txBox="1">
+            <a:spLocks/>
+          </p:cNvSpPr>
+          <p:nvPr/>
+        </p:nvSpPr>
+        <p:spPr>
+          <a:xfrm>
+            <a:off x="838200" y="1825625"/>
+            <a:ext cx="10515600" cy="4351338"/>
+          </a:xfrm>
+          <a:prstGeom prst="rect">
+            <a:avLst/>
+          </a:prstGeom>
+        </p:spPr>
+        <p:txBody>
+          <a:bodyPr vert="horz" lIns="91440" tIns="45720" rIns="91440" bIns="45720" rtlCol="0">
+            <a:normAutofit/>
+          </a:bodyPr>
+          <a:lstStyle>
+            <a:lvl1pPr marL="0" indent="0" algn="ctr" defTabSz="914400" rtl="0" eaLnBrk="1" latinLnBrk="0" hangingPunct="1">
+              <a:lnSpc>
+                <a:spcPct val="90000"/>
+              </a:lnSpc>
+              <a:spcBef>
+                <a:spcPts val="1000"/>
+              </a:spcBef>
+              <a:buFont typeface="Arial" panose="020B0604020202020204" pitchFamily="34" charset="0"/>
+              <a:buNone/>
+              <a:defRPr sz="2400" kern="1200">
+                <a:solidFill>
+                  <a:schemeClr val="tx1"/>
+                </a:solidFill>
+                <a:latin typeface="+mn-lt"/>
+                <a:ea typeface="+mn-ea"/>
+                <a:cs typeface="+mn-cs"/>
+              </a:defRPr>
+            </a:lvl1pPr>
+            <a:lvl2pPr marL="457200" indent="0" algn="ctr" defTabSz="914400" rtl="0" eaLnBrk="1" latinLnBrk="0" hangingPunct="1">
+              <a:lnSpc>
+                <a:spcPct val="90000"/>
+              </a:lnSpc>
+              <a:spcBef>
+                <a:spcPts val="500"/>
+              </a:spcBef>
+              <a:buFont typeface="Arial" panose="020B0604020202020204" pitchFamily="34" charset="0"/>
+              <a:buNone/>
+              <a:defRPr sz="2000" kern="1200">
+                <a:solidFill>
+                  <a:schemeClr val="tx1"/>
+                </a:solidFill>
+                <a:latin typeface="+mn-lt"/>
+                <a:ea typeface="+mn-ea"/>
+                <a:cs typeface="+mn-cs"/>
+              </a:defRPr>
+            </a:lvl2pPr>
+            <a:lvl3pPr marL="914400" indent="0" algn="ctr" defTabSz="914400" rtl="0" eaLnBrk="1" latinLnBrk="0" hangingPunct="1">
+              <a:lnSpc>
+                <a:spcPct val="90000"/>
+              </a:lnSpc>
+              <a:spcBef>
+                <a:spcPts val="500"/>
+              </a:spcBef>
+              <a:buFont typeface="Arial" panose="020B0604020202020204" pitchFamily="34" charset="0"/>
+              <a:buNone/>
+              <a:defRPr sz="1800" kern="1200">
+                <a:solidFill>
+                  <a:schemeClr val="tx1"/>
+                </a:solidFill>
+                <a:latin typeface="+mn-lt"/>
+                <a:ea typeface="+mn-ea"/>
+                <a:cs typeface="+mn-cs"/>
+              </a:defRPr>
+            </a:lvl3pPr>
+            <a:lvl4pPr marL="1371600" indent="0" algn="ctr" defTabSz="914400" rtl="0" eaLnBrk="1" latinLnBrk="0" hangingPunct="1">
+              <a:lnSpc>
+                <a:spcPct val="90000"/>
+              </a:lnSpc>
+              <a:spcBef>
+                <a:spcPts val="500"/>
+              </a:spcBef>
+              <a:buFont typeface="Arial" panose="020B0604020202020204" pitchFamily="34" charset="0"/>
+              <a:buNone/>
+              <a:defRPr sz="1600" kern="1200">
+                <a:solidFill>
+                  <a:schemeClr val="tx1"/>
+                </a:solidFill>
+                <a:latin typeface="+mn-lt"/>
+                <a:ea typeface="+mn-ea"/>
+                <a:cs typeface="+mn-cs"/>
+              </a:defRPr>
+            </a:lvl4pPr>
+            <a:lvl5pPr marL="1828800" indent="0" algn="ctr" defTabSz="914400" rtl="0" eaLnBrk="1" latinLnBrk="0" hangingPunct="1">
+              <a:lnSpc>
+                <a:spcPct val="90000"/>
+              </a:lnSpc>
+              <a:spcBef>
+                <a:spcPts val="500"/>
+              </a:spcBef>
+              <a:buFont typeface="Arial" panose="020B0604020202020204" pitchFamily="34" charset="0"/>
+              <a:buNone/>
+              <a:defRPr sz="1600" kern="1200">
+                <a:solidFill>
+                  <a:schemeClr val="tx1"/>
+                </a:solidFill>
+                <a:latin typeface="+mn-lt"/>
+                <a:ea typeface="+mn-ea"/>
+                <a:cs typeface="+mn-cs"/>
+              </a:defRPr>
+            </a:lvl5pPr>
+            <a:lvl6pPr marL="2286000" indent="0" algn="ctr" defTabSz="914400" rtl="0" eaLnBrk="1" latinLnBrk="0" hangingPunct="1">
+              <a:lnSpc>
+                <a:spcPct val="90000"/>
+              </a:lnSpc>
+              <a:spcBef>
+                <a:spcPts val="500"/>
+              </a:spcBef>
+              <a:buFont typeface="Arial" panose="020B0604020202020204" pitchFamily="34" charset="0"/>
+              <a:buNone/>
+              <a:defRPr sz="1600" kern="1200">
+                <a:solidFill>
+                  <a:schemeClr val="tx1"/>
+                </a:solidFill>
+                <a:latin typeface="+mn-lt"/>
+                <a:ea typeface="+mn-ea"/>
+                <a:cs typeface="+mn-cs"/>
+              </a:defRPr>
+            </a:lvl6pPr>
+            <a:lvl7pPr marL="2743200" indent="0" algn="ctr" defTabSz="914400" rtl="0" eaLnBrk="1" latinLnBrk="0" hangingPunct="1">
+              <a:lnSpc>
+                <a:spcPct val="90000"/>
+              </a:lnSpc>
+              <a:spcBef>
+                <a:spcPts val="500"/>
+              </a:spcBef>
+              <a:buFont typeface="Arial" panose="020B0604020202020204" pitchFamily="34" charset="0"/>
+              <a:buNone/>
+              <a:defRPr sz="1600" kern="1200">
+                <a:solidFill>
+                  <a:schemeClr val="tx1"/>
+                </a:solidFill>
+                <a:latin typeface="+mn-lt"/>
+                <a:ea typeface="+mn-ea"/>
+                <a:cs typeface="+mn-cs"/>
+              </a:defRPr>
+            </a:lvl7pPr>
+            <a:lvl8pPr marL="3200400" indent="0" algn="ctr" defTabSz="914400" rtl="0" eaLnBrk="1" latinLnBrk="0" hangingPunct="1">
+              <a:lnSpc>
+                <a:spcPct val="90000"/>
+              </a:lnSpc>
+              <a:spcBef>
+                <a:spcPts val="500"/>
+              </a:spcBef>
+              <a:buFont typeface="Arial" panose="020B0604020202020204" pitchFamily="34" charset="0"/>
+              <a:buNone/>
+              <a:defRPr sz="1600" kern="1200">
+                <a:solidFill>
+                  <a:schemeClr val="tx1"/>
+                </a:solidFill>
+                <a:latin typeface="+mn-lt"/>
+                <a:ea typeface="+mn-ea"/>
+                <a:cs typeface="+mn-cs"/>
+              </a:defRPr>
+            </a:lvl8pPr>
+            <a:lvl9pPr marL="3657600" indent="0" algn="ctr" defTabSz="914400" rtl="0" eaLnBrk="1" latinLnBrk="0" hangingPunct="1">
+              <a:lnSpc>
+                <a:spcPct val="90000"/>
+              </a:lnSpc>
+              <a:spcBef>
+                <a:spcPts val="500"/>
+              </a:spcBef>
+              <a:buFont typeface="Arial" panose="020B0604020202020204" pitchFamily="34" charset="0"/>
+              <a:buNone/>
+              <a:defRPr sz="1600" kern="1200">
+                <a:solidFill>
+                  <a:schemeClr val="tx1"/>
+                </a:solidFill>
+                <a:latin typeface="+mn-lt"/>
+                <a:ea typeface="+mn-ea"/>
+                <a:cs typeface="+mn-cs"/>
+              </a:defRPr>
+            </a:lvl9pPr>
+          </a:lstStyle>
+          <a:p>
+            <a:pPr lvl="1" algn="l"/>
+            <a:endParaRPr lang="en-US" b="1" dirty="0">
+              <a:solidFill>
+                <a:schemeClr val="accent2">
+                  <a:lumMod val="75000"/>
+                </a:schemeClr>
+              </a:solidFill>
+            </a:endParaRPr>
+          </a:p>
+          <a:p>
+            <a:pPr lvl="2" algn="l"/>
+            <a:endParaRPr lang="en-US" dirty="0"/>
+          </a:p>
+          <a:p>
+            <a:pPr lvl="2" algn="l"/>
+            <a:endParaRPr lang="en-US" dirty="0"/>
+          </a:p>
+          <a:p>
+            <a:pPr lvl="2" algn="l"/>
+            <a:endParaRPr lang="en-US" dirty="0"/>
+          </a:p>
+          <a:p>
+            <a:pPr lvl="2" algn="l"/>
+            <a:endParaRPr lang="en-US" dirty="0"/>
+          </a:p>
+        </p:txBody>
+      </p:sp>
+      <p:sp>
+        <p:nvSpPr>
+          <p:cNvPr id="8" name="Date Placeholder 3">
+            <a:extLst>
+              <a:ext uri="{FF2B5EF4-FFF2-40B4-BE49-F238E27FC236}">
+                <a16:creationId xmlns:a16="http://schemas.microsoft.com/office/drawing/2014/main" id="{F58E9A2E-5660-42AC-A637-A1785328783B}"/>
+              </a:ext>
+            </a:extLst>
+          </p:cNvPr>
+          <p:cNvSpPr>
+            <a:spLocks noGrp="1"/>
+          </p:cNvSpPr>
+          <p:nvPr>
+            <p:ph type="dt" sz="half" idx="10"/>
+          </p:nvPr>
+        </p:nvSpPr>
+        <p:spPr>
+          <a:xfrm>
+            <a:off x="838200" y="6356350"/>
+            <a:ext cx="2743200" cy="365125"/>
+          </a:xfrm>
+        </p:spPr>
+        <p:txBody>
+          <a:bodyPr/>
+          <a:lstStyle>
+            <a:lvl1pPr>
+              <a:defRPr>
+                <a:solidFill>
+                  <a:schemeClr val="tx1">
+                    <a:lumMod val="75000"/>
+                    <a:lumOff val="25000"/>
+                  </a:schemeClr>
+                </a:solidFill>
+              </a:defRPr>
+            </a:lvl1pPr>
+          </a:lstStyle>
+          <a:p>
+            <a:fld id="{F33E6DB1-1B46-4A9E-9DE0-FB3EA5E49B16}" type="datetimeFigureOut">
+              <a:rPr lang="en-US" smtClean="0"/>
+              <a:pPr/>
+              <a:t>6/12/18</a:t>
+            </a:fld>
+            <a:endParaRPr lang="en-US" dirty="0"/>
+          </a:p>
+        </p:txBody>
+      </p:sp>
+      <p:sp>
+        <p:nvSpPr>
+          <p:cNvPr id="9" name="Footer Placeholder 4">
+            <a:extLst>
+              <a:ext uri="{FF2B5EF4-FFF2-40B4-BE49-F238E27FC236}">
+                <a16:creationId xmlns:a16="http://schemas.microsoft.com/office/drawing/2014/main" id="{85AF6068-7533-4FF4-98FF-4FC28EA91E84}"/>
+              </a:ext>
+            </a:extLst>
+          </p:cNvPr>
+          <p:cNvSpPr>
+            <a:spLocks noGrp="1"/>
+          </p:cNvSpPr>
+          <p:nvPr>
+            <p:ph type="ftr" sz="quarter" idx="11"/>
+          </p:nvPr>
+        </p:nvSpPr>
+        <p:spPr>
+          <a:xfrm>
+            <a:off x="4038600" y="6356350"/>
+            <a:ext cx="4114800" cy="365125"/>
+          </a:xfrm>
+        </p:spPr>
+        <p:txBody>
+          <a:bodyPr/>
+          <a:lstStyle>
+            <a:lvl1pPr>
+              <a:defRPr>
+                <a:solidFill>
+                  <a:schemeClr val="tx1">
+                    <a:lumMod val="75000"/>
+                    <a:lumOff val="25000"/>
+                  </a:schemeClr>
+                </a:solidFill>
+              </a:defRPr>
+            </a:lvl1pPr>
+          </a:lstStyle>
+          <a:p>
+            <a:r>
+              <a:rPr lang="en-US" dirty="0"/>
+              <a:t>Crime in Chicago, A Socioeconomic Exploration</a:t>
+            </a:r>
+          </a:p>
+        </p:txBody>
+      </p:sp>
+      <p:sp>
+        <p:nvSpPr>
+          <p:cNvPr id="10" name="Slide Number Placeholder 5">
+            <a:extLst>
+              <a:ext uri="{FF2B5EF4-FFF2-40B4-BE49-F238E27FC236}">
+                <a16:creationId xmlns:a16="http://schemas.microsoft.com/office/drawing/2014/main" id="{8BEE74A5-734B-4BE0-B9D3-3B92252AA9B6}"/>
+              </a:ext>
+            </a:extLst>
+          </p:cNvPr>
+          <p:cNvSpPr>
+            <a:spLocks noGrp="1"/>
+          </p:cNvSpPr>
+          <p:nvPr>
+            <p:ph type="sldNum" sz="quarter" idx="12"/>
+          </p:nvPr>
+        </p:nvSpPr>
+        <p:spPr>
+          <a:xfrm>
+            <a:off x="8610600" y="6356350"/>
+            <a:ext cx="2743200" cy="365125"/>
+          </a:xfrm>
+        </p:spPr>
+        <p:txBody>
+          <a:bodyPr/>
+          <a:lstStyle>
+            <a:lvl1pPr>
+              <a:defRPr>
+                <a:solidFill>
+                  <a:schemeClr val="tx1">
+                    <a:lumMod val="75000"/>
+                    <a:lumOff val="25000"/>
+                  </a:schemeClr>
+                </a:solidFill>
+              </a:defRPr>
+            </a:lvl1pPr>
+          </a:lstStyle>
+          <a:p>
+            <a:fld id="{EB4E44DA-0EBF-471F-933A-3B031DA38E14}" type="slidenum">
+              <a:rPr lang="en-US" smtClean="0"/>
+              <a:pPr/>
+              <a:t>7</a:t>
+            </a:fld>
+            <a:endParaRPr lang="en-US" dirty="0"/>
+          </a:p>
+        </p:txBody>
+      </p:sp>
+      <p:pic>
+        <p:nvPicPr>
+          <p:cNvPr id="3" name="Picture 2">
+            <a:extLst>
+              <a:ext uri="{FF2B5EF4-FFF2-40B4-BE49-F238E27FC236}">
+                <a16:creationId xmlns:a16="http://schemas.microsoft.com/office/drawing/2014/main" id="{7B56FBC5-0583-704C-8589-D251FD4C3799}"/>
+              </a:ext>
+            </a:extLst>
+          </p:cNvPr>
+          <p:cNvPicPr>
+            <a:picLocks noChangeAspect="1"/>
+          </p:cNvPicPr>
+          <p:nvPr/>
+        </p:nvPicPr>
+        <p:blipFill>
+          <a:blip r:embed="rId2">
+            <a:extLst>
+              <a:ext uri="{28A0092B-C50C-407E-A947-70E740481C1C}">
+                <a14:useLocalDpi xmlns:a14="http://schemas.microsoft.com/office/drawing/2010/main" val="0"/>
+              </a:ext>
+            </a:extLst>
+          </a:blip>
+          <a:stretch>
+            <a:fillRect/>
+          </a:stretch>
+        </p:blipFill>
+        <p:spPr>
+          <a:xfrm>
+            <a:off x="1" y="1825624"/>
+            <a:ext cx="12192000" cy="5032375"/>
+          </a:xfrm>
+          <a:prstGeom prst="rect">
+            <a:avLst/>
+          </a:prstGeom>
+        </p:spPr>
+      </p:pic>
+    </p:spTree>
+    <p:extLst>
+      <p:ext uri="{BB962C8B-B14F-4D97-AF65-F5344CB8AC3E}">
+        <p14:creationId xmlns:p14="http://schemas.microsoft.com/office/powerpoint/2010/main" val="3400646291"/>
+      </p:ext>
+    </p:extLst>
+  </p:cSld>
+  <p:clrMapOvr>
+    <a:masterClrMapping/>
+  </p:clrMapOvr>
+  <mc:AlternateContent xmlns:mc="http://schemas.openxmlformats.org/markup-compatibility/2006" xmlns:p14="http://schemas.microsoft.com/office/powerpoint/2010/main">
+    <mc:Choice Requires="p14">
+      <p:transition spd="med" p14:dur="550">
+        <p:fade/>
+      </p:transition>
+    </mc:Choice>
+    <mc:Fallback xmlns="">
+      <p:transition spd="med">
+        <p:fade/>
+      </p:transition>
+    </mc:Fallback>
+  </mc:AlternateContent>
+</p:sld>
+</file>
+
+<file path=ppt/slides/slide8.xml><?xml version="1.0" encoding="utf-8"?>
+<p:sld xmlns:a="http://schemas.openxmlformats.org/drawingml/2006/main" xmlns:r="http://schemas.openxmlformats.org/officeDocument/2006/relationships" xmlns:p="http://schemas.openxmlformats.org/presentationml/2006/main">
+  <p:cSld>
+    <p:spTree>
+      <p:nvGrpSpPr>
+        <p:cNvPr id="1" name=""/>
+        <p:cNvGrpSpPr/>
+        <p:nvPr/>
+      </p:nvGrpSpPr>
+      <p:grpSpPr>
+        <a:xfrm>
+          <a:off x="0" y="0"/>
+          <a:ext cx="0" cy="0"/>
+          <a:chOff x="0" y="0"/>
+          <a:chExt cx="0" cy="0"/>
+        </a:xfrm>
+      </p:grpSpPr>
+      <p:sp>
+        <p:nvSpPr>
+          <p:cNvPr id="6" name="Title Placeholder 1">
+            <a:extLst>
+              <a:ext uri="{FF2B5EF4-FFF2-40B4-BE49-F238E27FC236}">
+                <a16:creationId xmlns:a16="http://schemas.microsoft.com/office/drawing/2014/main" id="{0B90DA6A-C92C-4324-A8B3-E2A135292587}"/>
+              </a:ext>
+            </a:extLst>
+          </p:cNvPr>
+          <p:cNvSpPr txBox="1">
+            <a:spLocks/>
+          </p:cNvSpPr>
+          <p:nvPr/>
+        </p:nvSpPr>
+        <p:spPr>
+          <a:xfrm>
+            <a:off x="838200" y="365126"/>
+            <a:ext cx="10515600" cy="779464"/>
+          </a:xfrm>
+          <a:prstGeom prst="rect">
+            <a:avLst/>
+          </a:prstGeom>
+        </p:spPr>
+        <p:txBody>
+          <a:bodyPr vert="horz" lIns="91440" tIns="45720" rIns="91440" bIns="45720" rtlCol="0" anchor="ctr">
+            <a:normAutofit fontScale="92500" lnSpcReduction="20000"/>
+          </a:bodyPr>
+          <a:lstStyle>
+            <a:lvl1pPr algn="ctr" defTabSz="914400" rtl="0" eaLnBrk="1" latinLnBrk="0" hangingPunct="1">
+              <a:lnSpc>
+                <a:spcPct val="90000"/>
+              </a:lnSpc>
+              <a:spcBef>
+                <a:spcPct val="0"/>
+              </a:spcBef>
+              <a:buNone/>
+              <a:defRPr sz="6000" kern="1200">
+                <a:solidFill>
+                  <a:schemeClr val="tx1"/>
+                </a:solidFill>
+                <a:latin typeface="+mj-lt"/>
+                <a:ea typeface="+mj-ea"/>
+                <a:cs typeface="+mj-cs"/>
+              </a:defRPr>
+            </a:lvl1pPr>
+          </a:lstStyle>
+          <a:p>
+            <a:r>
+              <a:rPr lang="en-US" dirty="0"/>
+              <a:t>Type of Crime</a:t>
+            </a:r>
+          </a:p>
+        </p:txBody>
+      </p:sp>
+      <p:sp>
+        <p:nvSpPr>
+          <p:cNvPr id="7" name="Text Placeholder 2">
+            <a:extLst>
+              <a:ext uri="{FF2B5EF4-FFF2-40B4-BE49-F238E27FC236}">
+                <a16:creationId xmlns:a16="http://schemas.microsoft.com/office/drawing/2014/main" id="{9167F074-A973-485B-8298-94398C48095C}"/>
+              </a:ext>
+            </a:extLst>
+          </p:cNvPr>
+          <p:cNvSpPr txBox="1">
+            <a:spLocks/>
+          </p:cNvSpPr>
+          <p:nvPr/>
+        </p:nvSpPr>
+        <p:spPr>
+          <a:xfrm>
+            <a:off x="838200" y="1825625"/>
+            <a:ext cx="10515600" cy="4351338"/>
+          </a:xfrm>
+          <a:prstGeom prst="rect">
+            <a:avLst/>
+          </a:prstGeom>
+        </p:spPr>
+        <p:txBody>
+          <a:bodyPr vert="horz" lIns="91440" tIns="45720" rIns="91440" bIns="45720" rtlCol="0">
+            <a:normAutofit/>
+          </a:bodyPr>
+          <a:lstStyle>
+            <a:lvl1pPr marL="0" indent="0" algn="ctr" defTabSz="914400" rtl="0" eaLnBrk="1" latinLnBrk="0" hangingPunct="1">
+              <a:lnSpc>
+                <a:spcPct val="90000"/>
+              </a:lnSpc>
+              <a:spcBef>
+                <a:spcPts val="1000"/>
+              </a:spcBef>
+              <a:buFont typeface="Arial" panose="020B0604020202020204" pitchFamily="34" charset="0"/>
+              <a:buNone/>
+              <a:defRPr sz="2400" kern="1200">
+                <a:solidFill>
+                  <a:schemeClr val="tx1"/>
+                </a:solidFill>
+                <a:latin typeface="+mn-lt"/>
+                <a:ea typeface="+mn-ea"/>
+                <a:cs typeface="+mn-cs"/>
+              </a:defRPr>
+            </a:lvl1pPr>
+            <a:lvl2pPr marL="457200" indent="0" algn="ctr" defTabSz="914400" rtl="0" eaLnBrk="1" latinLnBrk="0" hangingPunct="1">
+              <a:lnSpc>
+                <a:spcPct val="90000"/>
+              </a:lnSpc>
+              <a:spcBef>
+                <a:spcPts val="500"/>
+              </a:spcBef>
+              <a:buFont typeface="Arial" panose="020B0604020202020204" pitchFamily="34" charset="0"/>
+              <a:buNone/>
+              <a:defRPr sz="2000" kern="1200">
+                <a:solidFill>
+                  <a:schemeClr val="tx1"/>
+                </a:solidFill>
+                <a:latin typeface="+mn-lt"/>
+                <a:ea typeface="+mn-ea"/>
+                <a:cs typeface="+mn-cs"/>
+              </a:defRPr>
+            </a:lvl2pPr>
+            <a:lvl3pPr marL="914400" indent="0" algn="ctr" defTabSz="914400" rtl="0" eaLnBrk="1" latinLnBrk="0" hangingPunct="1">
+              <a:lnSpc>
+                <a:spcPct val="90000"/>
+              </a:lnSpc>
+              <a:spcBef>
+                <a:spcPts val="500"/>
+              </a:spcBef>
+              <a:buFont typeface="Arial" panose="020B0604020202020204" pitchFamily="34" charset="0"/>
+              <a:buNone/>
+              <a:defRPr sz="1800" kern="1200">
+                <a:solidFill>
+                  <a:schemeClr val="tx1"/>
+                </a:solidFill>
+                <a:latin typeface="+mn-lt"/>
+                <a:ea typeface="+mn-ea"/>
+                <a:cs typeface="+mn-cs"/>
+              </a:defRPr>
+            </a:lvl3pPr>
+            <a:lvl4pPr marL="1371600" indent="0" algn="ctr" defTabSz="914400" rtl="0" eaLnBrk="1" latinLnBrk="0" hangingPunct="1">
+              <a:lnSpc>
+                <a:spcPct val="90000"/>
+              </a:lnSpc>
+              <a:spcBef>
+                <a:spcPts val="500"/>
+              </a:spcBef>
+              <a:buFont typeface="Arial" panose="020B0604020202020204" pitchFamily="34" charset="0"/>
+              <a:buNone/>
+              <a:defRPr sz="1600" kern="1200">
+                <a:solidFill>
+                  <a:schemeClr val="tx1"/>
+                </a:solidFill>
+                <a:latin typeface="+mn-lt"/>
+                <a:ea typeface="+mn-ea"/>
+                <a:cs typeface="+mn-cs"/>
+              </a:defRPr>
+            </a:lvl4pPr>
+            <a:lvl5pPr marL="1828800" indent="0" algn="ctr" defTabSz="914400" rtl="0" eaLnBrk="1" latinLnBrk="0" hangingPunct="1">
+              <a:lnSpc>
+                <a:spcPct val="90000"/>
+              </a:lnSpc>
+              <a:spcBef>
+                <a:spcPts val="500"/>
+              </a:spcBef>
+              <a:buFont typeface="Arial" panose="020B0604020202020204" pitchFamily="34" charset="0"/>
+              <a:buNone/>
+              <a:defRPr sz="1600" kern="1200">
+                <a:solidFill>
+                  <a:schemeClr val="tx1"/>
+                </a:solidFill>
+                <a:latin typeface="+mn-lt"/>
+                <a:ea typeface="+mn-ea"/>
+                <a:cs typeface="+mn-cs"/>
+              </a:defRPr>
+            </a:lvl5pPr>
+            <a:lvl6pPr marL="2286000" indent="0" algn="ctr" defTabSz="914400" rtl="0" eaLnBrk="1" latinLnBrk="0" hangingPunct="1">
+              <a:lnSpc>
+                <a:spcPct val="90000"/>
+              </a:lnSpc>
+              <a:spcBef>
+                <a:spcPts val="500"/>
+              </a:spcBef>
+              <a:buFont typeface="Arial" panose="020B0604020202020204" pitchFamily="34" charset="0"/>
+              <a:buNone/>
+              <a:defRPr sz="1600" kern="1200">
+                <a:solidFill>
+                  <a:schemeClr val="tx1"/>
+                </a:solidFill>
+                <a:latin typeface="+mn-lt"/>
+                <a:ea typeface="+mn-ea"/>
+                <a:cs typeface="+mn-cs"/>
+              </a:defRPr>
+            </a:lvl6pPr>
+            <a:lvl7pPr marL="2743200" indent="0" algn="ctr" defTabSz="914400" rtl="0" eaLnBrk="1" latinLnBrk="0" hangingPunct="1">
+              <a:lnSpc>
+                <a:spcPct val="90000"/>
+              </a:lnSpc>
+              <a:spcBef>
+                <a:spcPts val="500"/>
+              </a:spcBef>
+              <a:buFont typeface="Arial" panose="020B0604020202020204" pitchFamily="34" charset="0"/>
+              <a:buNone/>
+              <a:defRPr sz="1600" kern="1200">
+                <a:solidFill>
+                  <a:schemeClr val="tx1"/>
+                </a:solidFill>
+                <a:latin typeface="+mn-lt"/>
+                <a:ea typeface="+mn-ea"/>
+                <a:cs typeface="+mn-cs"/>
+              </a:defRPr>
+            </a:lvl7pPr>
+            <a:lvl8pPr marL="3200400" indent="0" algn="ctr" defTabSz="914400" rtl="0" eaLnBrk="1" latinLnBrk="0" hangingPunct="1">
+              <a:lnSpc>
+                <a:spcPct val="90000"/>
+              </a:lnSpc>
+              <a:spcBef>
+                <a:spcPts val="500"/>
+              </a:spcBef>
+              <a:buFont typeface="Arial" panose="020B0604020202020204" pitchFamily="34" charset="0"/>
+              <a:buNone/>
+              <a:defRPr sz="1600" kern="1200">
+                <a:solidFill>
+                  <a:schemeClr val="tx1"/>
+                </a:solidFill>
+                <a:latin typeface="+mn-lt"/>
+                <a:ea typeface="+mn-ea"/>
+                <a:cs typeface="+mn-cs"/>
+              </a:defRPr>
+            </a:lvl8pPr>
+            <a:lvl9pPr marL="3657600" indent="0" algn="ctr" defTabSz="914400" rtl="0" eaLnBrk="1" latinLnBrk="0" hangingPunct="1">
+              <a:lnSpc>
+                <a:spcPct val="90000"/>
+              </a:lnSpc>
+              <a:spcBef>
+                <a:spcPts val="500"/>
+              </a:spcBef>
+              <a:buFont typeface="Arial" panose="020B0604020202020204" pitchFamily="34" charset="0"/>
+              <a:buNone/>
+              <a:defRPr sz="1600" kern="1200">
+                <a:solidFill>
+                  <a:schemeClr val="tx1"/>
+                </a:solidFill>
+                <a:latin typeface="+mn-lt"/>
+                <a:ea typeface="+mn-ea"/>
+                <a:cs typeface="+mn-cs"/>
+              </a:defRPr>
+            </a:lvl9pPr>
+          </a:lstStyle>
+          <a:p>
+            <a:pPr lvl="1" algn="l"/>
+            <a:endParaRPr lang="en-US" b="1" dirty="0">
+              <a:solidFill>
+                <a:schemeClr val="accent2">
+                  <a:lumMod val="75000"/>
+                </a:schemeClr>
+              </a:solidFill>
+            </a:endParaRPr>
+          </a:p>
+          <a:p>
+            <a:pPr lvl="2" algn="l"/>
+            <a:endParaRPr lang="en-US" dirty="0"/>
+          </a:p>
+          <a:p>
+            <a:pPr lvl="2" algn="l"/>
+            <a:endParaRPr lang="en-US" dirty="0"/>
+          </a:p>
+          <a:p>
+            <a:pPr lvl="2" algn="l"/>
+            <a:endParaRPr lang="en-US" dirty="0"/>
+          </a:p>
+          <a:p>
+            <a:pPr lvl="2" algn="l"/>
+            <a:endParaRPr lang="en-US" dirty="0"/>
+          </a:p>
+        </p:txBody>
+      </p:sp>
+      <p:sp>
+        <p:nvSpPr>
+          <p:cNvPr id="8" name="Date Placeholder 3">
+            <a:extLst>
+              <a:ext uri="{FF2B5EF4-FFF2-40B4-BE49-F238E27FC236}">
+                <a16:creationId xmlns:a16="http://schemas.microsoft.com/office/drawing/2014/main" id="{F58E9A2E-5660-42AC-A637-A1785328783B}"/>
+              </a:ext>
+            </a:extLst>
+          </p:cNvPr>
+          <p:cNvSpPr>
+            <a:spLocks noGrp="1"/>
+          </p:cNvSpPr>
+          <p:nvPr>
+            <p:ph type="dt" sz="half" idx="10"/>
+          </p:nvPr>
+        </p:nvSpPr>
+        <p:spPr>
+          <a:xfrm>
+            <a:off x="838200" y="6356350"/>
+            <a:ext cx="2743200" cy="365125"/>
+          </a:xfrm>
+        </p:spPr>
+        <p:txBody>
+          <a:bodyPr/>
+          <a:lstStyle>
+            <a:lvl1pPr>
+              <a:defRPr>
+                <a:solidFill>
+                  <a:schemeClr val="tx1">
+                    <a:lumMod val="75000"/>
+                    <a:lumOff val="25000"/>
+                  </a:schemeClr>
+                </a:solidFill>
+              </a:defRPr>
+            </a:lvl1pPr>
+          </a:lstStyle>
+          <a:p>
+            <a:fld id="{F33E6DB1-1B46-4A9E-9DE0-FB3EA5E49B16}" type="datetimeFigureOut">
+              <a:rPr lang="en-US" smtClean="0"/>
+              <a:pPr/>
+              <a:t>6/12/18</a:t>
+            </a:fld>
+            <a:endParaRPr lang="en-US" dirty="0"/>
+          </a:p>
+        </p:txBody>
+      </p:sp>
+      <p:sp>
+        <p:nvSpPr>
+          <p:cNvPr id="9" name="Footer Placeholder 4">
+            <a:extLst>
+              <a:ext uri="{FF2B5EF4-FFF2-40B4-BE49-F238E27FC236}">
+                <a16:creationId xmlns:a16="http://schemas.microsoft.com/office/drawing/2014/main" id="{85AF6068-7533-4FF4-98FF-4FC28EA91E84}"/>
+              </a:ext>
+            </a:extLst>
+          </p:cNvPr>
+          <p:cNvSpPr>
+            <a:spLocks noGrp="1"/>
+          </p:cNvSpPr>
+          <p:nvPr>
+            <p:ph type="ftr" sz="quarter" idx="11"/>
+          </p:nvPr>
+        </p:nvSpPr>
+        <p:spPr>
+          <a:xfrm>
+            <a:off x="4038600" y="6356350"/>
+            <a:ext cx="4114800" cy="365125"/>
+          </a:xfrm>
+        </p:spPr>
+        <p:txBody>
+          <a:bodyPr/>
+          <a:lstStyle>
+            <a:lvl1pPr>
+              <a:defRPr>
+                <a:solidFill>
+                  <a:schemeClr val="tx1">
+                    <a:lumMod val="75000"/>
+                    <a:lumOff val="25000"/>
+                  </a:schemeClr>
+                </a:solidFill>
+              </a:defRPr>
+            </a:lvl1pPr>
+          </a:lstStyle>
+          <a:p>
+            <a:r>
+              <a:rPr lang="en-US" dirty="0"/>
+              <a:t>Crime in Chicago, A Socioeconomic Exploration</a:t>
+            </a:r>
+          </a:p>
+        </p:txBody>
+      </p:sp>
+      <p:sp>
+        <p:nvSpPr>
+          <p:cNvPr id="10" name="Slide Number Placeholder 5">
+            <a:extLst>
+              <a:ext uri="{FF2B5EF4-FFF2-40B4-BE49-F238E27FC236}">
+                <a16:creationId xmlns:a16="http://schemas.microsoft.com/office/drawing/2014/main" id="{8BEE74A5-734B-4BE0-B9D3-3B92252AA9B6}"/>
+              </a:ext>
+            </a:extLst>
+          </p:cNvPr>
+          <p:cNvSpPr>
+            <a:spLocks noGrp="1"/>
+          </p:cNvSpPr>
+          <p:nvPr>
+            <p:ph type="sldNum" sz="quarter" idx="12"/>
+          </p:nvPr>
+        </p:nvSpPr>
+        <p:spPr>
+          <a:xfrm>
+            <a:off x="8610600" y="6356350"/>
+            <a:ext cx="2743200" cy="365125"/>
+          </a:xfrm>
+        </p:spPr>
+        <p:txBody>
+          <a:bodyPr/>
+          <a:lstStyle>
+            <a:lvl1pPr>
+              <a:defRPr>
+                <a:solidFill>
+                  <a:schemeClr val="tx1">
+                    <a:lumMod val="75000"/>
+                    <a:lumOff val="25000"/>
+                  </a:schemeClr>
+                </a:solidFill>
+              </a:defRPr>
+            </a:lvl1pPr>
+          </a:lstStyle>
+          <a:p>
+            <a:fld id="{EB4E44DA-0EBF-471F-933A-3B031DA38E14}" type="slidenum">
+              <a:rPr lang="en-US" smtClean="0"/>
+              <a:pPr/>
+              <a:t>8</a:t>
+            </a:fld>
+            <a:endParaRPr lang="en-US" dirty="0"/>
+          </a:p>
+        </p:txBody>
+      </p:sp>
+      <p:pic>
+        <p:nvPicPr>
+          <p:cNvPr id="4" name="Picture 3">
+            <a:extLst>
+              <a:ext uri="{FF2B5EF4-FFF2-40B4-BE49-F238E27FC236}">
+                <a16:creationId xmlns:a16="http://schemas.microsoft.com/office/drawing/2014/main" id="{B158EB27-50A9-A84A-9898-58D6E32C10C6}"/>
+              </a:ext>
+            </a:extLst>
+          </p:cNvPr>
+          <p:cNvPicPr>
+            <a:picLocks noChangeAspect="1"/>
+          </p:cNvPicPr>
+          <p:nvPr/>
+        </p:nvPicPr>
+        <p:blipFill>
+          <a:blip r:embed="rId2">
+            <a:extLst>
+              <a:ext uri="{28A0092B-C50C-407E-A947-70E740481C1C}">
+                <a14:useLocalDpi xmlns:a14="http://schemas.microsoft.com/office/drawing/2010/main" val="0"/>
+              </a:ext>
+            </a:extLst>
+          </a:blip>
+          <a:stretch>
+            <a:fillRect/>
+          </a:stretch>
+        </p:blipFill>
+        <p:spPr>
+          <a:xfrm>
+            <a:off x="1056904" y="1144590"/>
+            <a:ext cx="9607138" cy="5713409"/>
+          </a:xfrm>
+          <a:prstGeom prst="rect">
+            <a:avLst/>
+          </a:prstGeom>
+        </p:spPr>
+      </p:pic>
+    </p:spTree>
+    <p:extLst>
+      <p:ext uri="{BB962C8B-B14F-4D97-AF65-F5344CB8AC3E}">
+        <p14:creationId xmlns:p14="http://schemas.microsoft.com/office/powerpoint/2010/main" val="2075391206"/>
+      </p:ext>
+    </p:extLst>
+  </p:cSld>
+  <p:clrMapOvr>
+    <a:masterClrMapping/>
+  </p:clrMapOvr>
+  <mc:AlternateContent xmlns:mc="http://schemas.openxmlformats.org/markup-compatibility/2006" xmlns:p14="http://schemas.microsoft.com/office/powerpoint/2010/main">
+    <mc:Choice Requires="p14">
+      <p:transition spd="med" p14:dur="550">
+        <p:fade/>
+      </p:transition>
+    </mc:Choice>
+    <mc:Fallback xmlns="">
+      <p:transition spd="med">
+        <p:fade/>
+      </p:transition>
+    </mc:Fallback>
+  </mc:AlternateContent>
+</p:sld>
+</file>
+
+<file path=ppt/slides/slide9.xml><?xml version="1.0" encoding="utf-8"?>
+<p:sld xmlns:a="http://schemas.openxmlformats.org/drawingml/2006/main" xmlns:r="http://schemas.openxmlformats.org/officeDocument/2006/relationships" xmlns:p="http://schemas.openxmlformats.org/presentationml/2006/main">
+  <p:cSld>
+    <p:spTree>
+      <p:nvGrpSpPr>
+        <p:cNvPr id="1" name=""/>
+        <p:cNvGrpSpPr/>
+        <p:nvPr/>
+      </p:nvGrpSpPr>
+      <p:grpSpPr>
+        <a:xfrm>
+          <a:off x="0" y="0"/>
+          <a:ext cx="0" cy="0"/>
+          <a:chOff x="0" y="0"/>
+          <a:chExt cx="0" cy="0"/>
+        </a:xfrm>
+      </p:grpSpPr>
+      <p:sp>
+        <p:nvSpPr>
+          <p:cNvPr id="6" name="Title Placeholder 1">
+            <a:extLst>
+              <a:ext uri="{FF2B5EF4-FFF2-40B4-BE49-F238E27FC236}">
+                <a16:creationId xmlns:a16="http://schemas.microsoft.com/office/drawing/2014/main" id="{0B90DA6A-C92C-4324-A8B3-E2A135292587}"/>
+              </a:ext>
+            </a:extLst>
+          </p:cNvPr>
+          <p:cNvSpPr txBox="1">
+            <a:spLocks/>
+          </p:cNvSpPr>
+          <p:nvPr/>
+        </p:nvSpPr>
+        <p:spPr>
+          <a:xfrm>
+            <a:off x="838200" y="365126"/>
+            <a:ext cx="10515600" cy="915988"/>
+          </a:xfrm>
+          <a:prstGeom prst="rect">
+            <a:avLst/>
+          </a:prstGeom>
+        </p:spPr>
+        <p:txBody>
+          <a:bodyPr vert="horz" lIns="91440" tIns="45720" rIns="91440" bIns="45720" rtlCol="0" anchor="ctr">
+            <a:normAutofit/>
+          </a:bodyPr>
+          <a:lstStyle>
+            <a:lvl1pPr algn="ctr" defTabSz="914400" rtl="0" eaLnBrk="1" latinLnBrk="0" hangingPunct="1">
+              <a:lnSpc>
+                <a:spcPct val="90000"/>
+              </a:lnSpc>
+              <a:spcBef>
+                <a:spcPct val="0"/>
+              </a:spcBef>
+              <a:buNone/>
+              <a:defRPr sz="6000" kern="1200">
+                <a:solidFill>
+                  <a:schemeClr val="tx1"/>
+                </a:solidFill>
+                <a:latin typeface="+mj-lt"/>
+                <a:ea typeface="+mj-ea"/>
+                <a:cs typeface="+mj-cs"/>
+              </a:defRPr>
+            </a:lvl1pPr>
+          </a:lstStyle>
+          <a:p>
+            <a:r>
+              <a:rPr lang="en-US" dirty="0"/>
+              <a:t>Top Crime in Chicago</a:t>
+            </a:r>
+          </a:p>
+        </p:txBody>
+      </p:sp>
+      <p:sp>
+        <p:nvSpPr>
+          <p:cNvPr id="7" name="Text Placeholder 2">
+            <a:extLst>
+              <a:ext uri="{FF2B5EF4-FFF2-40B4-BE49-F238E27FC236}">
+                <a16:creationId xmlns:a16="http://schemas.microsoft.com/office/drawing/2014/main" id="{9167F074-A973-485B-8298-94398C48095C}"/>
+              </a:ext>
+            </a:extLst>
+          </p:cNvPr>
+          <p:cNvSpPr txBox="1">
+            <a:spLocks/>
+          </p:cNvSpPr>
+          <p:nvPr/>
+        </p:nvSpPr>
+        <p:spPr>
+          <a:xfrm>
+            <a:off x="838200" y="1825625"/>
+            <a:ext cx="10515600" cy="4351338"/>
+          </a:xfrm>
+          <a:prstGeom prst="rect">
+            <a:avLst/>
+          </a:prstGeom>
+        </p:spPr>
+        <p:txBody>
+          <a:bodyPr vert="horz" lIns="91440" tIns="45720" rIns="91440" bIns="45720" rtlCol="0">
+            <a:normAutofit/>
+          </a:bodyPr>
+          <a:lstStyle>
+            <a:lvl1pPr marL="0" indent="0" algn="ctr" defTabSz="914400" rtl="0" eaLnBrk="1" latinLnBrk="0" hangingPunct="1">
+              <a:lnSpc>
+                <a:spcPct val="90000"/>
+              </a:lnSpc>
+              <a:spcBef>
+                <a:spcPts val="1000"/>
+              </a:spcBef>
+              <a:buFont typeface="Arial" panose="020B0604020202020204" pitchFamily="34" charset="0"/>
+              <a:buNone/>
+              <a:defRPr sz="2400" kern="1200">
+                <a:solidFill>
+                  <a:schemeClr val="tx1"/>
+                </a:solidFill>
+                <a:latin typeface="+mn-lt"/>
+                <a:ea typeface="+mn-ea"/>
+                <a:cs typeface="+mn-cs"/>
+              </a:defRPr>
+            </a:lvl1pPr>
+            <a:lvl2pPr marL="457200" indent="0" algn="ctr" defTabSz="914400" rtl="0" eaLnBrk="1" latinLnBrk="0" hangingPunct="1">
+              <a:lnSpc>
+                <a:spcPct val="90000"/>
+              </a:lnSpc>
+              <a:spcBef>
+                <a:spcPts val="500"/>
+              </a:spcBef>
+              <a:buFont typeface="Arial" panose="020B0604020202020204" pitchFamily="34" charset="0"/>
+              <a:buNone/>
+              <a:defRPr sz="2000" kern="1200">
+                <a:solidFill>
+                  <a:schemeClr val="tx1"/>
+                </a:solidFill>
+                <a:latin typeface="+mn-lt"/>
+                <a:ea typeface="+mn-ea"/>
+                <a:cs typeface="+mn-cs"/>
+              </a:defRPr>
+            </a:lvl2pPr>
+            <a:lvl3pPr marL="914400" indent="0" algn="ctr" defTabSz="914400" rtl="0" eaLnBrk="1" latinLnBrk="0" hangingPunct="1">
+              <a:lnSpc>
+                <a:spcPct val="90000"/>
+              </a:lnSpc>
+              <a:spcBef>
+                <a:spcPts val="500"/>
+              </a:spcBef>
+              <a:buFont typeface="Arial" panose="020B0604020202020204" pitchFamily="34" charset="0"/>
+              <a:buNone/>
+              <a:defRPr sz="1800" kern="1200">
+                <a:solidFill>
+                  <a:schemeClr val="tx1"/>
+                </a:solidFill>
+                <a:latin typeface="+mn-lt"/>
+                <a:ea typeface="+mn-ea"/>
+                <a:cs typeface="+mn-cs"/>
+              </a:defRPr>
+            </a:lvl3pPr>
+            <a:lvl4pPr marL="1371600" indent="0" algn="ctr" defTabSz="914400" rtl="0" eaLnBrk="1" latinLnBrk="0" hangingPunct="1">
+              <a:lnSpc>
+                <a:spcPct val="90000"/>
+              </a:lnSpc>
+              <a:spcBef>
+                <a:spcPts val="500"/>
+              </a:spcBef>
+              <a:buFont typeface="Arial" panose="020B0604020202020204" pitchFamily="34" charset="0"/>
+              <a:buNone/>
+              <a:defRPr sz="1600" kern="1200">
+                <a:solidFill>
+                  <a:schemeClr val="tx1"/>
+                </a:solidFill>
+                <a:latin typeface="+mn-lt"/>
+                <a:ea typeface="+mn-ea"/>
+                <a:cs typeface="+mn-cs"/>
+              </a:defRPr>
+            </a:lvl4pPr>
+            <a:lvl5pPr marL="1828800" indent="0" algn="ctr" defTabSz="914400" rtl="0" eaLnBrk="1" latinLnBrk="0" hangingPunct="1">
+              <a:lnSpc>
+                <a:spcPct val="90000"/>
+              </a:lnSpc>
+              <a:spcBef>
+                <a:spcPts val="500"/>
+              </a:spcBef>
+              <a:buFont typeface="Arial" panose="020B0604020202020204" pitchFamily="34" charset="0"/>
+              <a:buNone/>
+              <a:defRPr sz="1600" kern="1200">
+                <a:solidFill>
+                  <a:schemeClr val="tx1"/>
+                </a:solidFill>
+                <a:latin typeface="+mn-lt"/>
+                <a:ea typeface="+mn-ea"/>
+                <a:cs typeface="+mn-cs"/>
+              </a:defRPr>
+            </a:lvl5pPr>
+            <a:lvl6pPr marL="2286000" indent="0" algn="ctr" defTabSz="914400" rtl="0" eaLnBrk="1" latinLnBrk="0" hangingPunct="1">
+              <a:lnSpc>
+                <a:spcPct val="90000"/>
+              </a:lnSpc>
+              <a:spcBef>
+                <a:spcPts val="500"/>
+              </a:spcBef>
+              <a:buFont typeface="Arial" panose="020B0604020202020204" pitchFamily="34" charset="0"/>
+              <a:buNone/>
+              <a:defRPr sz="1600" kern="1200">
+                <a:solidFill>
+                  <a:schemeClr val="tx1"/>
+                </a:solidFill>
+                <a:latin typeface="+mn-lt"/>
+                <a:ea typeface="+mn-ea"/>
+                <a:cs typeface="+mn-cs"/>
+              </a:defRPr>
+            </a:lvl6pPr>
+            <a:lvl7pPr marL="2743200" indent="0" algn="ctr" defTabSz="914400" rtl="0" eaLnBrk="1" latinLnBrk="0" hangingPunct="1">
+              <a:lnSpc>
+                <a:spcPct val="90000"/>
+              </a:lnSpc>
+              <a:spcBef>
+                <a:spcPts val="500"/>
+              </a:spcBef>
+              <a:buFont typeface="Arial" panose="020B0604020202020204" pitchFamily="34" charset="0"/>
+              <a:buNone/>
+              <a:defRPr sz="1600" kern="1200">
+                <a:solidFill>
+                  <a:schemeClr val="tx1"/>
+                </a:solidFill>
+                <a:latin typeface="+mn-lt"/>
+                <a:ea typeface="+mn-ea"/>
+                <a:cs typeface="+mn-cs"/>
+              </a:defRPr>
+            </a:lvl7pPr>
+            <a:lvl8pPr marL="3200400" indent="0" algn="ctr" defTabSz="914400" rtl="0" eaLnBrk="1" latinLnBrk="0" hangingPunct="1">
+              <a:lnSpc>
+                <a:spcPct val="90000"/>
+              </a:lnSpc>
+              <a:spcBef>
+                <a:spcPts val="500"/>
+              </a:spcBef>
+              <a:buFont typeface="Arial" panose="020B0604020202020204" pitchFamily="34" charset="0"/>
+              <a:buNone/>
+              <a:defRPr sz="1600" kern="1200">
+                <a:solidFill>
+                  <a:schemeClr val="tx1"/>
+                </a:solidFill>
+                <a:latin typeface="+mn-lt"/>
+                <a:ea typeface="+mn-ea"/>
+                <a:cs typeface="+mn-cs"/>
+              </a:defRPr>
+            </a:lvl8pPr>
+            <a:lvl9pPr marL="3657600" indent="0" algn="ctr" defTabSz="914400" rtl="0" eaLnBrk="1" latinLnBrk="0" hangingPunct="1">
+              <a:lnSpc>
+                <a:spcPct val="90000"/>
+              </a:lnSpc>
+              <a:spcBef>
+                <a:spcPts val="500"/>
+              </a:spcBef>
+              <a:buFont typeface="Arial" panose="020B0604020202020204" pitchFamily="34" charset="0"/>
+              <a:buNone/>
+              <a:defRPr sz="1600" kern="1200">
+                <a:solidFill>
+                  <a:schemeClr val="tx1"/>
+                </a:solidFill>
+                <a:latin typeface="+mn-lt"/>
+                <a:ea typeface="+mn-ea"/>
+                <a:cs typeface="+mn-cs"/>
+              </a:defRPr>
+            </a:lvl9pPr>
+          </a:lstStyle>
+          <a:p>
+            <a:pPr lvl="1" algn="l"/>
+            <a:endParaRPr lang="en-US" b="1" dirty="0">
+              <a:solidFill>
+                <a:schemeClr val="accent2">
+                  <a:lumMod val="75000"/>
+                </a:schemeClr>
+              </a:solidFill>
+            </a:endParaRPr>
+          </a:p>
+          <a:p>
+            <a:pPr lvl="2" algn="l"/>
+            <a:endParaRPr lang="en-US" dirty="0"/>
+          </a:p>
+          <a:p>
+            <a:pPr lvl="2" algn="l"/>
+            <a:endParaRPr lang="en-US" dirty="0"/>
+          </a:p>
+          <a:p>
+            <a:pPr lvl="2" algn="l"/>
+            <a:endParaRPr lang="en-US" dirty="0"/>
+          </a:p>
+          <a:p>
+            <a:pPr lvl="2" algn="l"/>
+            <a:endParaRPr lang="en-US" dirty="0"/>
+          </a:p>
+        </p:txBody>
+      </p:sp>
+      <p:sp>
+        <p:nvSpPr>
+          <p:cNvPr id="8" name="Date Placeholder 3">
+            <a:extLst>
+              <a:ext uri="{FF2B5EF4-FFF2-40B4-BE49-F238E27FC236}">
+                <a16:creationId xmlns:a16="http://schemas.microsoft.com/office/drawing/2014/main" id="{F58E9A2E-5660-42AC-A637-A1785328783B}"/>
+              </a:ext>
+            </a:extLst>
+          </p:cNvPr>
+          <p:cNvSpPr>
+            <a:spLocks noGrp="1"/>
+          </p:cNvSpPr>
+          <p:nvPr>
+            <p:ph type="dt" sz="half" idx="10"/>
+          </p:nvPr>
+        </p:nvSpPr>
+        <p:spPr>
+          <a:xfrm>
+            <a:off x="838200" y="6356350"/>
+            <a:ext cx="2743200" cy="365125"/>
+          </a:xfrm>
+        </p:spPr>
+        <p:txBody>
+          <a:bodyPr/>
+          <a:lstStyle>
+            <a:lvl1pPr>
+              <a:defRPr>
+                <a:solidFill>
+                  <a:schemeClr val="tx1">
+                    <a:lumMod val="75000"/>
+                    <a:lumOff val="25000"/>
+                  </a:schemeClr>
+                </a:solidFill>
+              </a:defRPr>
+            </a:lvl1pPr>
+          </a:lstStyle>
+          <a:p>
+            <a:fld id="{F33E6DB1-1B46-4A9E-9DE0-FB3EA5E49B16}" type="datetimeFigureOut">
+              <a:rPr lang="en-US" smtClean="0"/>
+              <a:pPr/>
+              <a:t>6/12/18</a:t>
+            </a:fld>
+            <a:endParaRPr lang="en-US" dirty="0"/>
+          </a:p>
+        </p:txBody>
+      </p:sp>
+      <p:sp>
+        <p:nvSpPr>
+          <p:cNvPr id="9" name="Footer Placeholder 4">
+            <a:extLst>
+              <a:ext uri="{FF2B5EF4-FFF2-40B4-BE49-F238E27FC236}">
+                <a16:creationId xmlns:a16="http://schemas.microsoft.com/office/drawing/2014/main" id="{85AF6068-7533-4FF4-98FF-4FC28EA91E84}"/>
+              </a:ext>
+            </a:extLst>
+          </p:cNvPr>
+          <p:cNvSpPr>
+            <a:spLocks noGrp="1"/>
+          </p:cNvSpPr>
+          <p:nvPr>
+            <p:ph type="ftr" sz="quarter" idx="11"/>
+          </p:nvPr>
+        </p:nvSpPr>
+        <p:spPr>
+          <a:xfrm>
+            <a:off x="4038600" y="6356350"/>
+            <a:ext cx="4114800" cy="365125"/>
+          </a:xfrm>
+        </p:spPr>
+        <p:txBody>
+          <a:bodyPr/>
+          <a:lstStyle>
+            <a:lvl1pPr>
+              <a:defRPr>
+                <a:solidFill>
+                  <a:schemeClr val="tx1">
+                    <a:lumMod val="75000"/>
+                    <a:lumOff val="25000"/>
+                  </a:schemeClr>
+                </a:solidFill>
+              </a:defRPr>
+            </a:lvl1pPr>
+          </a:lstStyle>
+          <a:p>
+            <a:r>
+              <a:rPr lang="en-US" dirty="0"/>
+              <a:t>Crime in Chicago, A Socioeconomic Exploration</a:t>
+            </a:r>
+          </a:p>
+        </p:txBody>
+      </p:sp>
+      <p:sp>
+        <p:nvSpPr>
+          <p:cNvPr id="10" name="Slide Number Placeholder 5">
+            <a:extLst>
+              <a:ext uri="{FF2B5EF4-FFF2-40B4-BE49-F238E27FC236}">
+                <a16:creationId xmlns:a16="http://schemas.microsoft.com/office/drawing/2014/main" id="{8BEE74A5-734B-4BE0-B9D3-3B92252AA9B6}"/>
+              </a:ext>
+            </a:extLst>
+          </p:cNvPr>
+          <p:cNvSpPr>
+            <a:spLocks noGrp="1"/>
+          </p:cNvSpPr>
+          <p:nvPr>
+            <p:ph type="sldNum" sz="quarter" idx="12"/>
+          </p:nvPr>
+        </p:nvSpPr>
+        <p:spPr>
+          <a:xfrm>
+            <a:off x="8610600" y="6356350"/>
+            <a:ext cx="2743200" cy="365125"/>
+          </a:xfrm>
+        </p:spPr>
+        <p:txBody>
+          <a:bodyPr/>
+          <a:lstStyle>
+            <a:lvl1pPr>
+              <a:defRPr>
+                <a:solidFill>
+                  <a:schemeClr val="tx1">
+                    <a:lumMod val="75000"/>
+                    <a:lumOff val="25000"/>
+                  </a:schemeClr>
+                </a:solidFill>
+              </a:defRPr>
+            </a:lvl1pPr>
+          </a:lstStyle>
+          <a:p>
+            <a:fld id="{EB4E44DA-0EBF-471F-933A-3B031DA38E14}" type="slidenum">
+              <a:rPr lang="en-US" smtClean="0"/>
+              <a:pPr/>
+              <a:t>9</a:t>
+            </a:fld>
+            <a:endParaRPr lang="en-US" dirty="0"/>
+          </a:p>
+        </p:txBody>
+      </p:sp>
+      <p:pic>
+        <p:nvPicPr>
+          <p:cNvPr id="3" name="Picture 2">
+            <a:extLst>
+              <a:ext uri="{FF2B5EF4-FFF2-40B4-BE49-F238E27FC236}">
+                <a16:creationId xmlns:a16="http://schemas.microsoft.com/office/drawing/2014/main" id="{C5427CC7-5D77-C044-A205-1B0C944300C8}"/>
+              </a:ext>
+            </a:extLst>
+          </p:cNvPr>
+          <p:cNvPicPr>
+            <a:picLocks noChangeAspect="1"/>
+          </p:cNvPicPr>
+          <p:nvPr/>
+        </p:nvPicPr>
+        <p:blipFill>
+          <a:blip r:embed="rId2">
+            <a:extLst>
+              <a:ext uri="{28A0092B-C50C-407E-A947-70E740481C1C}">
+                <a14:useLocalDpi xmlns:a14="http://schemas.microsoft.com/office/drawing/2010/main" val="0"/>
+              </a:ext>
+            </a:extLst>
+          </a:blip>
+          <a:stretch>
+            <a:fillRect/>
+          </a:stretch>
+        </p:blipFill>
+        <p:spPr>
+          <a:xfrm>
+            <a:off x="285750" y="1360488"/>
+            <a:ext cx="11601450" cy="5281612"/>
+          </a:xfrm>
+          <a:prstGeom prst="rect">
+            <a:avLst/>
+          </a:prstGeom>
+        </p:spPr>
+      </p:pic>
+    </p:spTree>
+    <p:extLst>
+      <p:ext uri="{BB962C8B-B14F-4D97-AF65-F5344CB8AC3E}">
+        <p14:creationId xmlns:p14="http://schemas.microsoft.com/office/powerpoint/2010/main" val="4057771339"/>
+      </p:ext>
+    </p:extLst>
+  </p:cSld>
+  <p:clrMapOvr>
+    <a:masterClrMapping/>
+  </p:clrMapOvr>
+  <mc:AlternateContent xmlns:mc="http://schemas.openxmlformats.org/markup-compatibility/2006" xmlns:p14="http://schemas.microsoft.com/office/powerpoint/2010/main">
+    <mc:Choice Requires="p14">
+      <p:transition spd="med" p14:dur="550">
+        <p:fade/>
+      </p:transition>
+    </mc:Choice>
+    <mc:Fallback xmlns="">
       <p:transition spd="med">
         <p:fade/>
       </p:transition>

</xml_diff>